<commit_message>
updated powerpoint and report
</commit_message>
<xml_diff>
--- a/Final.pptx
+++ b/Final.pptx
@@ -4,20 +4,27 @@
   <p:sldMasterIdLst>
     <p:sldMasterId id="2147483648" r:id="rId1"/>
   </p:sldMasterIdLst>
+  <p:notesMasterIdLst>
+    <p:notesMasterId r:id="rId19"/>
+  </p:notesMasterIdLst>
   <p:sldIdLst>
     <p:sldId id="268" r:id="rId2"/>
-    <p:sldId id="269" r:id="rId3"/>
-    <p:sldId id="267" r:id="rId4"/>
-    <p:sldId id="261" r:id="rId5"/>
-    <p:sldId id="265" r:id="rId6"/>
-    <p:sldId id="266" r:id="rId7"/>
-    <p:sldId id="257" r:id="rId8"/>
-    <p:sldId id="263" r:id="rId9"/>
-    <p:sldId id="258" r:id="rId10"/>
-    <p:sldId id="264" r:id="rId11"/>
-    <p:sldId id="260" r:id="rId12"/>
-    <p:sldId id="262" r:id="rId13"/>
-    <p:sldId id="259" r:id="rId14"/>
+    <p:sldId id="270" r:id="rId3"/>
+    <p:sldId id="271" r:id="rId4"/>
+    <p:sldId id="275" r:id="rId5"/>
+    <p:sldId id="272" r:id="rId6"/>
+    <p:sldId id="273" r:id="rId7"/>
+    <p:sldId id="274" r:id="rId8"/>
+    <p:sldId id="261" r:id="rId9"/>
+    <p:sldId id="265" r:id="rId10"/>
+    <p:sldId id="266" r:id="rId11"/>
+    <p:sldId id="257" r:id="rId12"/>
+    <p:sldId id="263" r:id="rId13"/>
+    <p:sldId id="258" r:id="rId14"/>
+    <p:sldId id="264" r:id="rId15"/>
+    <p:sldId id="260" r:id="rId16"/>
+    <p:sldId id="262" r:id="rId17"/>
+    <p:sldId id="259" r:id="rId18"/>
   </p:sldIdLst>
   <p:sldSz cx="12192000" cy="6858000"/>
   <p:notesSz cx="6858000" cy="9144000"/>
@@ -124,6 +131,355 @@
 </p:presentation>
 </file>
 
+<file path=ppt/notesMasters/notesMaster1.xml><?xml version="1.0" encoding="utf-8"?>
+<p:notesMaster xmlns:a="http://schemas.openxmlformats.org/drawingml/2006/main" xmlns:r="http://schemas.openxmlformats.org/officeDocument/2006/relationships" xmlns:p="http://schemas.openxmlformats.org/presentationml/2006/main">
+  <p:cSld>
+    <p:bg>
+      <p:bgRef idx="1001">
+        <a:schemeClr val="bg1"/>
+      </p:bgRef>
+    </p:bg>
+    <p:spTree>
+      <p:nvGrpSpPr>
+        <p:cNvPr id="1" name=""/>
+        <p:cNvGrpSpPr/>
+        <p:nvPr/>
+      </p:nvGrpSpPr>
+      <p:grpSpPr>
+        <a:xfrm>
+          <a:off x="0" y="0"/>
+          <a:ext cx="0" cy="0"/>
+          <a:chOff x="0" y="0"/>
+          <a:chExt cx="0" cy="0"/>
+        </a:xfrm>
+      </p:grpSpPr>
+      <p:sp>
+        <p:nvSpPr>
+          <p:cNvPr id="2" name="Header Placeholder 1"/>
+          <p:cNvSpPr>
+            <a:spLocks noGrp="1"/>
+          </p:cNvSpPr>
+          <p:nvPr>
+            <p:ph type="hdr" sz="quarter"/>
+          </p:nvPr>
+        </p:nvSpPr>
+        <p:spPr>
+          <a:xfrm>
+            <a:off x="0" y="0"/>
+            <a:ext cx="2971800" cy="458788"/>
+          </a:xfrm>
+          <a:prstGeom prst="rect">
+            <a:avLst/>
+          </a:prstGeom>
+        </p:spPr>
+        <p:txBody>
+          <a:bodyPr vert="horz" lIns="91440" tIns="45720" rIns="91440" bIns="45720" rtlCol="0"/>
+          <a:lstStyle>
+            <a:lvl1pPr algn="l">
+              <a:defRPr sz="1200"/>
+            </a:lvl1pPr>
+          </a:lstStyle>
+          <a:p>
+            <a:endParaRPr lang="en-US"/>
+          </a:p>
+        </p:txBody>
+      </p:sp>
+      <p:sp>
+        <p:nvSpPr>
+          <p:cNvPr id="3" name="Date Placeholder 2"/>
+          <p:cNvSpPr>
+            <a:spLocks noGrp="1"/>
+          </p:cNvSpPr>
+          <p:nvPr>
+            <p:ph type="dt" idx="1"/>
+          </p:nvPr>
+        </p:nvSpPr>
+        <p:spPr>
+          <a:xfrm>
+            <a:off x="3884613" y="0"/>
+            <a:ext cx="2971800" cy="458788"/>
+          </a:xfrm>
+          <a:prstGeom prst="rect">
+            <a:avLst/>
+          </a:prstGeom>
+        </p:spPr>
+        <p:txBody>
+          <a:bodyPr vert="horz" lIns="91440" tIns="45720" rIns="91440" bIns="45720" rtlCol="0"/>
+          <a:lstStyle>
+            <a:lvl1pPr algn="r">
+              <a:defRPr sz="1200"/>
+            </a:lvl1pPr>
+          </a:lstStyle>
+          <a:p>
+            <a:fld id="{49CFBA21-E163-4E8D-AFAA-7ACA4BA4394B}" type="datetimeFigureOut">
+              <a:rPr lang="en-US" smtClean="0"/>
+              <a:t>5/3/2017</a:t>
+            </a:fld>
+            <a:endParaRPr lang="en-US"/>
+          </a:p>
+        </p:txBody>
+      </p:sp>
+      <p:sp>
+        <p:nvSpPr>
+          <p:cNvPr id="4" name="Slide Image Placeholder 3"/>
+          <p:cNvSpPr>
+            <a:spLocks noGrp="1" noRot="1" noChangeAspect="1"/>
+          </p:cNvSpPr>
+          <p:nvPr>
+            <p:ph type="sldImg" idx="2"/>
+          </p:nvPr>
+        </p:nvSpPr>
+        <p:spPr>
+          <a:xfrm>
+            <a:off x="685800" y="1143000"/>
+            <a:ext cx="5486400" cy="3086100"/>
+          </a:xfrm>
+          <a:prstGeom prst="rect">
+            <a:avLst/>
+          </a:prstGeom>
+          <a:noFill/>
+          <a:ln w="12700">
+            <a:solidFill>
+              <a:prstClr val="black"/>
+            </a:solidFill>
+          </a:ln>
+        </p:spPr>
+        <p:txBody>
+          <a:bodyPr vert="horz" lIns="91440" tIns="45720" rIns="91440" bIns="45720" rtlCol="0" anchor="ctr"/>
+          <a:lstStyle/>
+          <a:p>
+            <a:endParaRPr lang="en-US"/>
+          </a:p>
+        </p:txBody>
+      </p:sp>
+      <p:sp>
+        <p:nvSpPr>
+          <p:cNvPr id="5" name="Notes Placeholder 4"/>
+          <p:cNvSpPr>
+            <a:spLocks noGrp="1"/>
+          </p:cNvSpPr>
+          <p:nvPr>
+            <p:ph type="body" sz="quarter" idx="3"/>
+          </p:nvPr>
+        </p:nvSpPr>
+        <p:spPr>
+          <a:xfrm>
+            <a:off x="685800" y="4400550"/>
+            <a:ext cx="5486400" cy="3600450"/>
+          </a:xfrm>
+          <a:prstGeom prst="rect">
+            <a:avLst/>
+          </a:prstGeom>
+        </p:spPr>
+        <p:txBody>
+          <a:bodyPr vert="horz" lIns="91440" tIns="45720" rIns="91440" bIns="45720" rtlCol="0"/>
+          <a:lstStyle/>
+          <a:p>
+            <a:pPr lvl="0"/>
+            <a:r>
+              <a:rPr lang="en-US"/>
+              <a:t>Edit Master text styles</a:t>
+            </a:r>
+          </a:p>
+          <a:p>
+            <a:pPr lvl="1"/>
+            <a:r>
+              <a:rPr lang="en-US"/>
+              <a:t>Second level</a:t>
+            </a:r>
+          </a:p>
+          <a:p>
+            <a:pPr lvl="2"/>
+            <a:r>
+              <a:rPr lang="en-US"/>
+              <a:t>Third level</a:t>
+            </a:r>
+          </a:p>
+          <a:p>
+            <a:pPr lvl="3"/>
+            <a:r>
+              <a:rPr lang="en-US"/>
+              <a:t>Fourth level</a:t>
+            </a:r>
+          </a:p>
+          <a:p>
+            <a:pPr lvl="4"/>
+            <a:r>
+              <a:rPr lang="en-US"/>
+              <a:t>Fifth level</a:t>
+            </a:r>
+          </a:p>
+        </p:txBody>
+      </p:sp>
+      <p:sp>
+        <p:nvSpPr>
+          <p:cNvPr id="6" name="Footer Placeholder 5"/>
+          <p:cNvSpPr>
+            <a:spLocks noGrp="1"/>
+          </p:cNvSpPr>
+          <p:nvPr>
+            <p:ph type="ftr" sz="quarter" idx="4"/>
+          </p:nvPr>
+        </p:nvSpPr>
+        <p:spPr>
+          <a:xfrm>
+            <a:off x="0" y="8685213"/>
+            <a:ext cx="2971800" cy="458787"/>
+          </a:xfrm>
+          <a:prstGeom prst="rect">
+            <a:avLst/>
+          </a:prstGeom>
+        </p:spPr>
+        <p:txBody>
+          <a:bodyPr vert="horz" lIns="91440" tIns="45720" rIns="91440" bIns="45720" rtlCol="0" anchor="b"/>
+          <a:lstStyle>
+            <a:lvl1pPr algn="l">
+              <a:defRPr sz="1200"/>
+            </a:lvl1pPr>
+          </a:lstStyle>
+          <a:p>
+            <a:endParaRPr lang="en-US"/>
+          </a:p>
+        </p:txBody>
+      </p:sp>
+      <p:sp>
+        <p:nvSpPr>
+          <p:cNvPr id="7" name="Slide Number Placeholder 6"/>
+          <p:cNvSpPr>
+            <a:spLocks noGrp="1"/>
+          </p:cNvSpPr>
+          <p:nvPr>
+            <p:ph type="sldNum" sz="quarter" idx="5"/>
+          </p:nvPr>
+        </p:nvSpPr>
+        <p:spPr>
+          <a:xfrm>
+            <a:off x="3884613" y="8685213"/>
+            <a:ext cx="2971800" cy="458787"/>
+          </a:xfrm>
+          <a:prstGeom prst="rect">
+            <a:avLst/>
+          </a:prstGeom>
+        </p:spPr>
+        <p:txBody>
+          <a:bodyPr vert="horz" lIns="91440" tIns="45720" rIns="91440" bIns="45720" rtlCol="0" anchor="b"/>
+          <a:lstStyle>
+            <a:lvl1pPr algn="r">
+              <a:defRPr sz="1200"/>
+            </a:lvl1pPr>
+          </a:lstStyle>
+          <a:p>
+            <a:fld id="{AD644DD1-AC5C-49B1-AFBB-6A20A54DBC39}" type="slidenum">
+              <a:rPr lang="en-US" smtClean="0"/>
+              <a:t>‹#›</a:t>
+            </a:fld>
+            <a:endParaRPr lang="en-US"/>
+          </a:p>
+        </p:txBody>
+      </p:sp>
+    </p:spTree>
+    <p:extLst>
+      <p:ext uri="{BB962C8B-B14F-4D97-AF65-F5344CB8AC3E}">
+        <p14:creationId xmlns:p14="http://schemas.microsoft.com/office/powerpoint/2010/main" val="1396663966"/>
+      </p:ext>
+    </p:extLst>
+  </p:cSld>
+  <p:clrMap bg1="lt1" tx1="dk1" bg2="lt2" tx2="dk2" accent1="accent1" accent2="accent2" accent3="accent3" accent4="accent4" accent5="accent5" accent6="accent6" hlink="hlink" folHlink="folHlink"/>
+  <p:notesStyle>
+    <a:lvl1pPr marL="0" algn="l" defTabSz="914400" rtl="0" eaLnBrk="1" latinLnBrk="0" hangingPunct="1">
+      <a:defRPr sz="1200" kern="1200">
+        <a:solidFill>
+          <a:schemeClr val="tx1"/>
+        </a:solidFill>
+        <a:latin typeface="+mn-lt"/>
+        <a:ea typeface="+mn-ea"/>
+        <a:cs typeface="+mn-cs"/>
+      </a:defRPr>
+    </a:lvl1pPr>
+    <a:lvl2pPr marL="457200" algn="l" defTabSz="914400" rtl="0" eaLnBrk="1" latinLnBrk="0" hangingPunct="1">
+      <a:defRPr sz="1200" kern="1200">
+        <a:solidFill>
+          <a:schemeClr val="tx1"/>
+        </a:solidFill>
+        <a:latin typeface="+mn-lt"/>
+        <a:ea typeface="+mn-ea"/>
+        <a:cs typeface="+mn-cs"/>
+      </a:defRPr>
+    </a:lvl2pPr>
+    <a:lvl3pPr marL="914400" algn="l" defTabSz="914400" rtl="0" eaLnBrk="1" latinLnBrk="0" hangingPunct="1">
+      <a:defRPr sz="1200" kern="1200">
+        <a:solidFill>
+          <a:schemeClr val="tx1"/>
+        </a:solidFill>
+        <a:latin typeface="+mn-lt"/>
+        <a:ea typeface="+mn-ea"/>
+        <a:cs typeface="+mn-cs"/>
+      </a:defRPr>
+    </a:lvl3pPr>
+    <a:lvl4pPr marL="1371600" algn="l" defTabSz="914400" rtl="0" eaLnBrk="1" latinLnBrk="0" hangingPunct="1">
+      <a:defRPr sz="1200" kern="1200">
+        <a:solidFill>
+          <a:schemeClr val="tx1"/>
+        </a:solidFill>
+        <a:latin typeface="+mn-lt"/>
+        <a:ea typeface="+mn-ea"/>
+        <a:cs typeface="+mn-cs"/>
+      </a:defRPr>
+    </a:lvl4pPr>
+    <a:lvl5pPr marL="1828800" algn="l" defTabSz="914400" rtl="0" eaLnBrk="1" latinLnBrk="0" hangingPunct="1">
+      <a:defRPr sz="1200" kern="1200">
+        <a:solidFill>
+          <a:schemeClr val="tx1"/>
+        </a:solidFill>
+        <a:latin typeface="+mn-lt"/>
+        <a:ea typeface="+mn-ea"/>
+        <a:cs typeface="+mn-cs"/>
+      </a:defRPr>
+    </a:lvl5pPr>
+    <a:lvl6pPr marL="2286000" algn="l" defTabSz="914400" rtl="0" eaLnBrk="1" latinLnBrk="0" hangingPunct="1">
+      <a:defRPr sz="1200" kern="1200">
+        <a:solidFill>
+          <a:schemeClr val="tx1"/>
+        </a:solidFill>
+        <a:latin typeface="+mn-lt"/>
+        <a:ea typeface="+mn-ea"/>
+        <a:cs typeface="+mn-cs"/>
+      </a:defRPr>
+    </a:lvl6pPr>
+    <a:lvl7pPr marL="2743200" algn="l" defTabSz="914400" rtl="0" eaLnBrk="1" latinLnBrk="0" hangingPunct="1">
+      <a:defRPr sz="1200" kern="1200">
+        <a:solidFill>
+          <a:schemeClr val="tx1"/>
+        </a:solidFill>
+        <a:latin typeface="+mn-lt"/>
+        <a:ea typeface="+mn-ea"/>
+        <a:cs typeface="+mn-cs"/>
+      </a:defRPr>
+    </a:lvl7pPr>
+    <a:lvl8pPr marL="3200400" algn="l" defTabSz="914400" rtl="0" eaLnBrk="1" latinLnBrk="0" hangingPunct="1">
+      <a:defRPr sz="1200" kern="1200">
+        <a:solidFill>
+          <a:schemeClr val="tx1"/>
+        </a:solidFill>
+        <a:latin typeface="+mn-lt"/>
+        <a:ea typeface="+mn-ea"/>
+        <a:cs typeface="+mn-cs"/>
+      </a:defRPr>
+    </a:lvl8pPr>
+    <a:lvl9pPr marL="3657600" algn="l" defTabSz="914400" rtl="0" eaLnBrk="1" latinLnBrk="0" hangingPunct="1">
+      <a:defRPr sz="1200" kern="1200">
+        <a:solidFill>
+          <a:schemeClr val="tx1"/>
+        </a:solidFill>
+        <a:latin typeface="+mn-lt"/>
+        <a:ea typeface="+mn-ea"/>
+        <a:cs typeface="+mn-cs"/>
+      </a:defRPr>
+    </a:lvl9pPr>
+  </p:notesStyle>
+</p:notesMaster>
+</file>
+
 <file path=ppt/slideLayouts/slideLayout1.xml><?xml version="1.0" encoding="utf-8"?>
 <p:sldLayout xmlns:a="http://schemas.openxmlformats.org/drawingml/2006/main" xmlns:r="http://schemas.openxmlformats.org/officeDocument/2006/relationships" xmlns:p="http://schemas.openxmlformats.org/presentationml/2006/main" type="title" preserve="1">
   <p:cSld name="Title Slide">
@@ -253,7 +609,7 @@
           <a:p>
             <a:fld id="{A91B730E-5284-4953-8624-3FE068A9D426}" type="datetimeFigureOut">
               <a:rPr lang="en-US" smtClean="0"/>
-              <a:t>5/1/2017</a:t>
+              <a:t>5/3/2017</a:t>
             </a:fld>
             <a:endParaRPr lang="en-US"/>
           </a:p>
@@ -421,7 +777,7 @@
           <a:p>
             <a:fld id="{A91B730E-5284-4953-8624-3FE068A9D426}" type="datetimeFigureOut">
               <a:rPr lang="en-US" smtClean="0"/>
-              <a:t>5/1/2017</a:t>
+              <a:t>5/3/2017</a:t>
             </a:fld>
             <a:endParaRPr lang="en-US"/>
           </a:p>
@@ -599,7 +955,7 @@
           <a:p>
             <a:fld id="{A91B730E-5284-4953-8624-3FE068A9D426}" type="datetimeFigureOut">
               <a:rPr lang="en-US" smtClean="0"/>
-              <a:t>5/1/2017</a:t>
+              <a:t>5/3/2017</a:t>
             </a:fld>
             <a:endParaRPr lang="en-US"/>
           </a:p>
@@ -767,7 +1123,7 @@
           <a:p>
             <a:fld id="{A91B730E-5284-4953-8624-3FE068A9D426}" type="datetimeFigureOut">
               <a:rPr lang="en-US" smtClean="0"/>
-              <a:t>5/1/2017</a:t>
+              <a:t>5/3/2017</a:t>
             </a:fld>
             <a:endParaRPr lang="en-US"/>
           </a:p>
@@ -1012,7 +1368,7 @@
           <a:p>
             <a:fld id="{A91B730E-5284-4953-8624-3FE068A9D426}" type="datetimeFigureOut">
               <a:rPr lang="en-US" smtClean="0"/>
-              <a:t>5/1/2017</a:t>
+              <a:t>5/3/2017</a:t>
             </a:fld>
             <a:endParaRPr lang="en-US"/>
           </a:p>
@@ -1241,7 +1597,7 @@
           <a:p>
             <a:fld id="{A91B730E-5284-4953-8624-3FE068A9D426}" type="datetimeFigureOut">
               <a:rPr lang="en-US" smtClean="0"/>
-              <a:t>5/1/2017</a:t>
+              <a:t>5/3/2017</a:t>
             </a:fld>
             <a:endParaRPr lang="en-US"/>
           </a:p>
@@ -1605,7 +1961,7 @@
           <a:p>
             <a:fld id="{A91B730E-5284-4953-8624-3FE068A9D426}" type="datetimeFigureOut">
               <a:rPr lang="en-US" smtClean="0"/>
-              <a:t>5/1/2017</a:t>
+              <a:t>5/3/2017</a:t>
             </a:fld>
             <a:endParaRPr lang="en-US"/>
           </a:p>
@@ -1722,7 +2078,7 @@
           <a:p>
             <a:fld id="{A91B730E-5284-4953-8624-3FE068A9D426}" type="datetimeFigureOut">
               <a:rPr lang="en-US" smtClean="0"/>
-              <a:t>5/1/2017</a:t>
+              <a:t>5/3/2017</a:t>
             </a:fld>
             <a:endParaRPr lang="en-US"/>
           </a:p>
@@ -1817,7 +2173,7 @@
           <a:p>
             <a:fld id="{A91B730E-5284-4953-8624-3FE068A9D426}" type="datetimeFigureOut">
               <a:rPr lang="en-US" smtClean="0"/>
-              <a:t>5/1/2017</a:t>
+              <a:t>5/3/2017</a:t>
             </a:fld>
             <a:endParaRPr lang="en-US"/>
           </a:p>
@@ -2092,7 +2448,7 @@
           <a:p>
             <a:fld id="{A91B730E-5284-4953-8624-3FE068A9D426}" type="datetimeFigureOut">
               <a:rPr lang="en-US" smtClean="0"/>
-              <a:t>5/1/2017</a:t>
+              <a:t>5/3/2017</a:t>
             </a:fld>
             <a:endParaRPr lang="en-US"/>
           </a:p>
@@ -2344,7 +2700,7 @@
           <a:p>
             <a:fld id="{A91B730E-5284-4953-8624-3FE068A9D426}" type="datetimeFigureOut">
               <a:rPr lang="en-US" smtClean="0"/>
-              <a:t>5/1/2017</a:t>
+              <a:t>5/3/2017</a:t>
             </a:fld>
             <a:endParaRPr lang="en-US"/>
           </a:p>
@@ -2555,7 +2911,7 @@
           <a:p>
             <a:fld id="{A91B730E-5284-4953-8624-3FE068A9D426}" type="datetimeFigureOut">
               <a:rPr lang="en-US" smtClean="0"/>
-              <a:t>5/1/2017</a:t>
+              <a:t>5/3/2017</a:t>
             </a:fld>
             <a:endParaRPr lang="en-US"/>
           </a:p>
@@ -3462,71 +3818,196 @@
             <a:pPr algn="ctr"/>
             <a:r>
               <a:rPr lang="en-US" dirty="0"/>
-              <a:t>RGB Gradient Given 3 Celsius Values</a:t>
-            </a:r>
-          </a:p>
-        </p:txBody>
-      </p:sp>
-      <p:sp>
-        <p:nvSpPr>
-          <p:cNvPr id="3" name="Content Placeholder 2"/>
-          <p:cNvSpPr>
-            <a:spLocks noGrp="1"/>
-          </p:cNvSpPr>
+              <a:t>Linear Interpolation Between 2 Points</a:t>
+            </a:r>
+          </a:p>
+        </p:txBody>
+      </p:sp>
+      <p:pic>
+        <p:nvPicPr>
+          <p:cNvPr id="5" name="Content Placeholder 4"/>
+          <p:cNvPicPr>
+            <a:picLocks noGrp="1" noChangeAspect="1"/>
+          </p:cNvPicPr>
           <p:nvPr>
             <p:ph idx="1"/>
           </p:nvPr>
-        </p:nvSpPr>
-        <p:spPr/>
-        <p:txBody>
-          <a:bodyPr/>
-          <a:lstStyle/>
-          <a:p>
-            <a:r>
-              <a:rPr lang="en-US" dirty="0"/>
-              <a:t>Problems</a:t>
-            </a:r>
-          </a:p>
-          <a:p>
-            <a:pPr lvl="1"/>
-            <a:r>
-              <a:rPr lang="en-US" dirty="0"/>
-              <a:t> 510 gradient assumes constant gradient between all 3 points.</a:t>
-            </a:r>
-          </a:p>
-          <a:p>
-            <a:pPr lvl="2"/>
-            <a:r>
-              <a:rPr lang="en-US" dirty="0"/>
-              <a:t>3 Celsius values are (assumed to be) random at any point in time. Therefore the slope between any two points is also random.</a:t>
-            </a:r>
-          </a:p>
-          <a:p>
-            <a:pPr lvl="1"/>
-            <a:r>
-              <a:rPr lang="en-US" dirty="0"/>
-              <a:t>Conversion between Celsius and RGB</a:t>
-            </a:r>
-          </a:p>
-          <a:p>
-            <a:pPr lvl="2"/>
-            <a:r>
-              <a:rPr lang="en-US" dirty="0"/>
-              <a:t>Converting from RGB to “true” RGB from graphs and equations</a:t>
-            </a:r>
-          </a:p>
-          <a:p>
-            <a:pPr marL="0" indent="0">
-              <a:buNone/>
+        </p:nvPicPr>
+        <p:blipFill>
+          <a:blip r:embed="rId2">
+            <a:extLst>
+              <a:ext uri="{28A0092B-C50C-407E-A947-70E740481C1C}">
+                <a14:useLocalDpi xmlns:a14="http://schemas.microsoft.com/office/drawing/2010/main" val="0"/>
+              </a:ext>
+            </a:extLst>
+          </a:blip>
+          <a:stretch>
+            <a:fillRect/>
+          </a:stretch>
+        </p:blipFill>
+        <p:spPr>
+          <a:xfrm>
+            <a:off x="7492273" y="5357620"/>
+            <a:ext cx="2867425" cy="990738"/>
+          </a:xfrm>
+        </p:spPr>
+      </p:pic>
+      <p:sp>
+        <p:nvSpPr>
+          <p:cNvPr id="8" name="TextBox 7"/>
+          <p:cNvSpPr txBox="1"/>
+          <p:nvPr/>
+        </p:nvSpPr>
+        <p:spPr>
+          <a:xfrm>
+            <a:off x="709127" y="1690688"/>
+            <a:ext cx="4674636" cy="369332"/>
+          </a:xfrm>
+          <a:prstGeom prst="rect">
+            <a:avLst/>
+          </a:prstGeom>
+          <a:noFill/>
+        </p:spPr>
+        <p:txBody>
+          <a:bodyPr wrap="square" rtlCol="0">
+            <a:spAutoFit/>
+          </a:bodyPr>
+          <a:lstStyle/>
+          <a:p>
+            <a:endParaRPr lang="en-US" dirty="0"/>
+          </a:p>
+        </p:txBody>
+      </p:sp>
+      <p:pic>
+        <p:nvPicPr>
+          <p:cNvPr id="10" name="Picture 9"/>
+          <p:cNvPicPr>
+            <a:picLocks noChangeAspect="1"/>
+          </p:cNvPicPr>
+          <p:nvPr/>
+        </p:nvPicPr>
+        <p:blipFill>
+          <a:blip r:embed="rId3">
+            <a:extLst>
+              <a:ext uri="{28A0092B-C50C-407E-A947-70E740481C1C}">
+                <a14:useLocalDpi xmlns:a14="http://schemas.microsoft.com/office/drawing/2010/main" val="0"/>
+              </a:ext>
+            </a:extLst>
+          </a:blip>
+          <a:stretch>
+            <a:fillRect/>
+          </a:stretch>
+        </p:blipFill>
+        <p:spPr>
+          <a:xfrm>
+            <a:off x="7402804" y="1882639"/>
+            <a:ext cx="3046362" cy="3033117"/>
+          </a:xfrm>
+          <a:prstGeom prst="rect">
+            <a:avLst/>
+          </a:prstGeom>
+        </p:spPr>
+      </p:pic>
+      <p:sp>
+        <p:nvSpPr>
+          <p:cNvPr id="11" name="TextBox 10"/>
+          <p:cNvSpPr txBox="1"/>
+          <p:nvPr/>
+        </p:nvSpPr>
+        <p:spPr>
+          <a:xfrm>
+            <a:off x="709127" y="1690688"/>
+            <a:ext cx="5971591" cy="2862322"/>
+          </a:xfrm>
+          <a:prstGeom prst="rect">
+            <a:avLst/>
+          </a:prstGeom>
+          <a:noFill/>
+        </p:spPr>
+        <p:txBody>
+          <a:bodyPr wrap="square" rtlCol="0">
+            <a:spAutoFit/>
+          </a:bodyPr>
+          <a:lstStyle/>
+          <a:p>
+            <a:r>
+              <a:rPr lang="en-US" dirty="0"/>
+              <a:t>RED = -RGB + 255</a:t>
+            </a:r>
+          </a:p>
+          <a:p>
+            <a:r>
+              <a:rPr lang="en-US" dirty="0"/>
+              <a:t>BLUE = RGB</a:t>
+            </a:r>
+          </a:p>
+          <a:p>
+            <a:endParaRPr lang="en-US" dirty="0"/>
+          </a:p>
+          <a:p>
+            <a:r>
+              <a:rPr lang="en-US" dirty="0"/>
+              <a:t>Color(true RGB) = (RED, 0, BLUE)</a:t>
+            </a:r>
+          </a:p>
+          <a:p>
+            <a:r>
+              <a:rPr lang="en-US" dirty="0"/>
+              <a:t>Pros:</a:t>
+            </a:r>
+          </a:p>
+          <a:p>
+            <a:pPr marL="285750" indent="-285750">
+              <a:buFont typeface="Arial" panose="020B0604020202020204" pitchFamily="34" charset="0"/>
+              <a:buChar char="•"/>
             </a:pPr>
-            <a:endParaRPr lang="en-US" dirty="0"/>
+            <a:r>
+              <a:rPr lang="en-US" dirty="0"/>
+              <a:t>Nice gradient between points</a:t>
+            </a:r>
+          </a:p>
+          <a:p>
+            <a:pPr marL="285750" indent="-285750">
+              <a:buFont typeface="Arial" panose="020B0604020202020204" pitchFamily="34" charset="0"/>
+              <a:buChar char="•"/>
+            </a:pPr>
+            <a:r>
+              <a:rPr lang="en-US" dirty="0"/>
+              <a:t>Covers “hot” and “cold” conditions</a:t>
+            </a:r>
+          </a:p>
+          <a:p>
+            <a:r>
+              <a:rPr lang="en-US" dirty="0"/>
+              <a:t>Cons:</a:t>
+            </a:r>
+          </a:p>
+          <a:p>
+            <a:pPr marL="285750" indent="-285750">
+              <a:buFont typeface="Arial" panose="020B0604020202020204" pitchFamily="34" charset="0"/>
+              <a:buChar char="•"/>
+            </a:pPr>
+            <a:r>
+              <a:rPr lang="en-US" dirty="0"/>
+              <a:t>Lacks color</a:t>
+            </a:r>
+          </a:p>
+          <a:p>
+            <a:pPr marL="742950" lvl="1" indent="-285750">
+              <a:buFont typeface="Arial" panose="020B0604020202020204" pitchFamily="34" charset="0"/>
+              <a:buChar char="•"/>
+            </a:pPr>
+            <a:r>
+              <a:rPr lang="en-US" dirty="0"/>
+              <a:t>No one wants a 2 color heat map!</a:t>
+            </a:r>
           </a:p>
         </p:txBody>
       </p:sp>
     </p:spTree>
     <p:extLst>
       <p:ext uri="{BB962C8B-B14F-4D97-AF65-F5344CB8AC3E}">
-        <p14:creationId xmlns:p14="http://schemas.microsoft.com/office/powerpoint/2010/main" val="4193747219"/>
+        <p14:creationId xmlns:p14="http://schemas.microsoft.com/office/powerpoint/2010/main" val="3625730890"/>
       </p:ext>
     </p:extLst>
   </p:cSld>
@@ -3563,106 +4044,181 @@
             <p:ph type="title"/>
           </p:nvPr>
         </p:nvSpPr>
-        <p:spPr/>
+        <p:spPr>
+          <a:xfrm>
+            <a:off x="838200" y="365125"/>
+            <a:ext cx="10515600" cy="1325563"/>
+          </a:xfrm>
+        </p:spPr>
         <p:txBody>
           <a:bodyPr/>
           <a:lstStyle/>
           <a:p>
             <a:pPr algn="ctr"/>
             <a:r>
-              <a:rPr lang="en-US" dirty="0"/>
-              <a:t>Celsius to RGB Conversion</a:t>
-            </a:r>
-          </a:p>
-        </p:txBody>
-      </p:sp>
-      <p:sp>
-        <p:nvSpPr>
-          <p:cNvPr id="3" name="Content Placeholder 2"/>
-          <p:cNvSpPr>
-            <a:spLocks noGrp="1"/>
-          </p:cNvSpPr>
+              <a:rPr lang="en-US"/>
+              <a:t>1020 RGB Linear Interpolation</a:t>
+            </a:r>
+            <a:endParaRPr lang="en-US" dirty="0"/>
+          </a:p>
+        </p:txBody>
+      </p:sp>
+      <p:pic>
+        <p:nvPicPr>
+          <p:cNvPr id="4" name="Content Placeholder 3"/>
+          <p:cNvPicPr>
+            <a:picLocks noGrp="1" noChangeAspect="1"/>
+          </p:cNvPicPr>
           <p:nvPr>
             <p:ph idx="1"/>
           </p:nvPr>
-        </p:nvSpPr>
-        <p:spPr/>
-        <p:txBody>
-          <a:bodyPr/>
-          <a:lstStyle/>
-          <a:p>
-            <a:pPr marL="457200" lvl="1" indent="0">
-              <a:buNone/>
+        </p:nvPicPr>
+        <p:blipFill>
+          <a:blip r:embed="rId2">
+            <a:extLst>
+              <a:ext uri="{28A0092B-C50C-407E-A947-70E740481C1C}">
+                <a14:useLocalDpi xmlns:a14="http://schemas.microsoft.com/office/drawing/2010/main" val="0"/>
+              </a:ext>
+            </a:extLst>
+          </a:blip>
+          <a:stretch>
+            <a:fillRect/>
+          </a:stretch>
+        </p:blipFill>
+        <p:spPr>
+          <a:xfrm>
+            <a:off x="3886033" y="1690688"/>
+            <a:ext cx="8161421" cy="2635535"/>
+          </a:xfrm>
+        </p:spPr>
+      </p:pic>
+      <p:pic>
+        <p:nvPicPr>
+          <p:cNvPr id="5" name="Picture 4"/>
+          <p:cNvPicPr>
+            <a:picLocks noChangeAspect="1"/>
+          </p:cNvPicPr>
+          <p:nvPr/>
+        </p:nvPicPr>
+        <p:blipFill>
+          <a:blip r:embed="rId3">
+            <a:extLst>
+              <a:ext uri="{28A0092B-C50C-407E-A947-70E740481C1C}">
+                <a14:useLocalDpi xmlns:a14="http://schemas.microsoft.com/office/drawing/2010/main" val="0"/>
+              </a:ext>
+            </a:extLst>
+          </a:blip>
+          <a:stretch>
+            <a:fillRect/>
+          </a:stretch>
+        </p:blipFill>
+        <p:spPr>
+          <a:xfrm>
+            <a:off x="3886033" y="4519939"/>
+            <a:ext cx="8305967" cy="976720"/>
+          </a:xfrm>
+          <a:prstGeom prst="rect">
+            <a:avLst/>
+          </a:prstGeom>
+        </p:spPr>
+      </p:pic>
+      <p:sp>
+        <p:nvSpPr>
+          <p:cNvPr id="6" name="TextBox 5"/>
+          <p:cNvSpPr txBox="1"/>
+          <p:nvPr/>
+        </p:nvSpPr>
+        <p:spPr>
+          <a:xfrm>
+            <a:off x="343948" y="1690688"/>
+            <a:ext cx="3187817" cy="3970318"/>
+          </a:xfrm>
+          <a:prstGeom prst="rect">
+            <a:avLst/>
+          </a:prstGeom>
+          <a:noFill/>
+        </p:spPr>
+        <p:txBody>
+          <a:bodyPr wrap="square" rtlCol="0">
+            <a:spAutoFit/>
+          </a:bodyPr>
+          <a:lstStyle/>
+          <a:p>
+            <a:r>
+              <a:rPr lang="en-US"/>
+              <a:t>3 colors (Red, Green, Blue) each with a range of 255 –&gt; </a:t>
+            </a:r>
+          </a:p>
+          <a:p>
+            <a:r>
+              <a:rPr lang="en-US"/>
+              <a:t>1020 different values (Assuming start condition of max blue and end condition of max red).</a:t>
+            </a:r>
+          </a:p>
+          <a:p>
+            <a:endParaRPr lang="en-US"/>
+          </a:p>
+          <a:p>
+            <a:r>
+              <a:rPr lang="en-US"/>
+              <a:t>Pros:</a:t>
+            </a:r>
+          </a:p>
+          <a:p>
+            <a:pPr marL="285750" indent="-285750">
+              <a:buFont typeface="Arial" panose="020B0604020202020204" pitchFamily="34" charset="0"/>
+              <a:buChar char="•"/>
             </a:pPr>
-            <a:endParaRPr lang="en-US" dirty="0"/>
-          </a:p>
-          <a:p>
-            <a:pPr lvl="1"/>
-            <a:r>
-              <a:rPr lang="en-US" dirty="0"/>
-              <a:t>Assumptions:</a:t>
-            </a:r>
-          </a:p>
-          <a:p>
-            <a:pPr lvl="2"/>
-            <a:r>
-              <a:rPr lang="en-US" dirty="0"/>
-              <a:t>Max degree Celsius – 110</a:t>
-            </a:r>
-          </a:p>
-          <a:p>
-            <a:pPr lvl="2"/>
-            <a:r>
-              <a:rPr lang="en-US" dirty="0"/>
-              <a:t>Min degree Celsius – 0</a:t>
-            </a:r>
-          </a:p>
-          <a:p>
-            <a:pPr lvl="1"/>
-            <a:r>
-              <a:rPr lang="en-US" dirty="0"/>
-              <a:t>510 Linear RGB Interpolation</a:t>
-            </a:r>
-          </a:p>
-          <a:p>
-            <a:pPr lvl="2"/>
-            <a:r>
-              <a:rPr lang="en-US" dirty="0"/>
-              <a:t>RGB = (Scaling Factor)(Degree C)</a:t>
-            </a:r>
-          </a:p>
-          <a:p>
-            <a:pPr lvl="2"/>
-            <a:r>
-              <a:rPr lang="en-US" dirty="0"/>
-              <a:t>Scaling Factor is a ratio</a:t>
-            </a:r>
-          </a:p>
-          <a:p>
-            <a:pPr lvl="2"/>
-            <a:r>
-              <a:rPr lang="en-US" dirty="0"/>
-              <a:t>Scaling Factor = #RGB values / #Possible Degree C = 510 / 110</a:t>
-            </a:r>
-          </a:p>
-          <a:p>
-            <a:pPr lvl="2"/>
-            <a:endParaRPr lang="en-US" dirty="0"/>
-          </a:p>
-          <a:p>
-            <a:pPr lvl="2"/>
-            <a:endParaRPr lang="en-US" dirty="0"/>
-          </a:p>
-          <a:p>
-            <a:pPr lvl="1"/>
-            <a:endParaRPr lang="en-US" dirty="0"/>
-          </a:p>
-          <a:p>
-            <a:pPr lvl="1"/>
-            <a:endParaRPr lang="en-US" dirty="0"/>
-          </a:p>
-          <a:p>
-            <a:pPr lvl="1"/>
+            <a:r>
+              <a:rPr lang="en-US"/>
+              <a:t>Lots of color. </a:t>
+            </a:r>
+          </a:p>
+          <a:p>
+            <a:pPr marL="285750" indent="-285750">
+              <a:buFont typeface="Arial" panose="020B0604020202020204" pitchFamily="34" charset="0"/>
+              <a:buChar char="•"/>
+            </a:pPr>
+            <a:r>
+              <a:rPr lang="en-US"/>
+              <a:t>Not only hot and cold but warm</a:t>
+            </a:r>
+          </a:p>
+          <a:p>
+            <a:r>
+              <a:rPr lang="en-US"/>
+              <a:t>Cons:</a:t>
+            </a:r>
+          </a:p>
+          <a:p>
+            <a:pPr marL="285750" indent="-285750">
+              <a:buFont typeface="Arial" panose="020B0604020202020204" pitchFamily="34" charset="0"/>
+              <a:buChar char="•"/>
+            </a:pPr>
+            <a:r>
+              <a:rPr lang="en-US"/>
+              <a:t>No color between heat zones</a:t>
+            </a:r>
+          </a:p>
+          <a:p>
+            <a:pPr marL="742950" lvl="1" indent="-285750">
+              <a:buFont typeface="Arial" panose="020B0604020202020204" pitchFamily="34" charset="0"/>
+              <a:buChar char="•"/>
+            </a:pPr>
+            <a:r>
+              <a:rPr lang="en-US"/>
+              <a:t>Hot? Cold?</a:t>
+            </a:r>
+          </a:p>
+          <a:p>
+            <a:pPr marL="285750" indent="-285750">
+              <a:buFont typeface="Arial" panose="020B0604020202020204" pitchFamily="34" charset="0"/>
+              <a:buChar char="•"/>
+            </a:pPr>
+            <a:r>
+              <a:rPr lang="en-US"/>
+              <a:t>No gradient</a:t>
+            </a:r>
             <a:endParaRPr lang="en-US" dirty="0"/>
           </a:p>
         </p:txBody>
@@ -3670,7 +4226,7 @@
     </p:spTree>
     <p:extLst>
       <p:ext uri="{BB962C8B-B14F-4D97-AF65-F5344CB8AC3E}">
-        <p14:creationId xmlns:p14="http://schemas.microsoft.com/office/powerpoint/2010/main" val="4272314917"/>
+        <p14:creationId xmlns:p14="http://schemas.microsoft.com/office/powerpoint/2010/main" val="1674379375"/>
       </p:ext>
     </p:extLst>
   </p:cSld>
@@ -3697,6 +4253,594 @@
           <a:chExt cx="0" cy="0"/>
         </a:xfrm>
       </p:grpSpPr>
+      <p:pic>
+        <p:nvPicPr>
+          <p:cNvPr id="11" name="Picture 10"/>
+          <p:cNvPicPr>
+            <a:picLocks noChangeAspect="1"/>
+          </p:cNvPicPr>
+          <p:nvPr/>
+        </p:nvPicPr>
+        <p:blipFill>
+          <a:blip r:embed="rId2">
+            <a:extLst>
+              <a:ext uri="{28A0092B-C50C-407E-A947-70E740481C1C}">
+                <a14:useLocalDpi xmlns:a14="http://schemas.microsoft.com/office/drawing/2010/main" val="0"/>
+              </a:ext>
+            </a:extLst>
+          </a:blip>
+          <a:stretch>
+            <a:fillRect/>
+          </a:stretch>
+        </p:blipFill>
+        <p:spPr>
+          <a:xfrm>
+            <a:off x="1319703" y="2313817"/>
+            <a:ext cx="3399294" cy="2686204"/>
+          </a:xfrm>
+          <a:prstGeom prst="rect">
+            <a:avLst/>
+          </a:prstGeom>
+        </p:spPr>
+      </p:pic>
+      <p:sp>
+        <p:nvSpPr>
+          <p:cNvPr id="2" name="Title 1"/>
+          <p:cNvSpPr>
+            <a:spLocks noGrp="1"/>
+          </p:cNvSpPr>
+          <p:nvPr>
+            <p:ph type="title"/>
+          </p:nvPr>
+        </p:nvSpPr>
+        <p:spPr/>
+        <p:txBody>
+          <a:bodyPr/>
+          <a:lstStyle/>
+          <a:p>
+            <a:pPr algn="ctr"/>
+            <a:r>
+              <a:rPr lang="en-US" dirty="0"/>
+              <a:t>510 RGB Linear Interpolation</a:t>
+            </a:r>
+          </a:p>
+        </p:txBody>
+      </p:sp>
+      <p:pic>
+        <p:nvPicPr>
+          <p:cNvPr id="5" name="Content Placeholder 4"/>
+          <p:cNvPicPr>
+            <a:picLocks noGrp="1" noChangeAspect="1"/>
+          </p:cNvPicPr>
+          <p:nvPr>
+            <p:ph idx="1"/>
+          </p:nvPr>
+        </p:nvPicPr>
+        <p:blipFill>
+          <a:blip r:embed="rId3">
+            <a:extLst>
+              <a:ext uri="{28A0092B-C50C-407E-A947-70E740481C1C}">
+                <a14:useLocalDpi xmlns:a14="http://schemas.microsoft.com/office/drawing/2010/main" val="0"/>
+              </a:ext>
+            </a:extLst>
+          </a:blip>
+          <a:stretch>
+            <a:fillRect/>
+          </a:stretch>
+        </p:blipFill>
+        <p:spPr>
+          <a:xfrm>
+            <a:off x="6441829" y="1690688"/>
+            <a:ext cx="5247747" cy="3309333"/>
+          </a:xfrm>
+        </p:spPr>
+      </p:pic>
+      <p:pic>
+        <p:nvPicPr>
+          <p:cNvPr id="7" name="Picture 6"/>
+          <p:cNvPicPr>
+            <a:picLocks noChangeAspect="1"/>
+          </p:cNvPicPr>
+          <p:nvPr/>
+        </p:nvPicPr>
+        <p:blipFill>
+          <a:blip r:embed="rId4">
+            <a:extLst>
+              <a:ext uri="{28A0092B-C50C-407E-A947-70E740481C1C}">
+                <a14:useLocalDpi xmlns:a14="http://schemas.microsoft.com/office/drawing/2010/main" val="0"/>
+              </a:ext>
+            </a:extLst>
+          </a:blip>
+          <a:stretch>
+            <a:fillRect/>
+          </a:stretch>
+        </p:blipFill>
+        <p:spPr>
+          <a:xfrm>
+            <a:off x="6488200" y="5000021"/>
+            <a:ext cx="5201376" cy="1295581"/>
+          </a:xfrm>
+          <a:prstGeom prst="rect">
+            <a:avLst/>
+          </a:prstGeom>
+        </p:spPr>
+      </p:pic>
+      <p:sp>
+        <p:nvSpPr>
+          <p:cNvPr id="9" name="TextBox 8"/>
+          <p:cNvSpPr txBox="1"/>
+          <p:nvPr/>
+        </p:nvSpPr>
+        <p:spPr>
+          <a:xfrm>
+            <a:off x="440764" y="1690688"/>
+            <a:ext cx="6241409" cy="4801314"/>
+          </a:xfrm>
+          <a:prstGeom prst="rect">
+            <a:avLst/>
+          </a:prstGeom>
+          <a:noFill/>
+        </p:spPr>
+        <p:txBody>
+          <a:bodyPr wrap="square" rtlCol="0">
+            <a:spAutoFit/>
+          </a:bodyPr>
+          <a:lstStyle/>
+          <a:p>
+            <a:r>
+              <a:rPr lang="en-US" dirty="0"/>
+              <a:t>Cut the number of RGB values in half. </a:t>
+            </a:r>
+          </a:p>
+          <a:p>
+            <a:endParaRPr lang="en-US" dirty="0"/>
+          </a:p>
+          <a:p>
+            <a:endParaRPr lang="en-US" dirty="0"/>
+          </a:p>
+          <a:p>
+            <a:endParaRPr lang="en-US" dirty="0"/>
+          </a:p>
+          <a:p>
+            <a:endParaRPr lang="en-US" dirty="0"/>
+          </a:p>
+          <a:p>
+            <a:endParaRPr lang="en-US" dirty="0"/>
+          </a:p>
+          <a:p>
+            <a:endParaRPr lang="en-US" dirty="0"/>
+          </a:p>
+          <a:p>
+            <a:endParaRPr lang="en-US" dirty="0"/>
+          </a:p>
+          <a:p>
+            <a:endParaRPr lang="en-US" dirty="0"/>
+          </a:p>
+          <a:p>
+            <a:endParaRPr lang="en-US" dirty="0"/>
+          </a:p>
+          <a:p>
+            <a:endParaRPr lang="en-US" dirty="0"/>
+          </a:p>
+          <a:p>
+            <a:r>
+              <a:rPr lang="en-US" dirty="0"/>
+              <a:t>Pros:</a:t>
+            </a:r>
+          </a:p>
+          <a:p>
+            <a:pPr marL="285750" indent="-285750">
+              <a:buFont typeface="Arial" panose="020B0604020202020204" pitchFamily="34" charset="0"/>
+              <a:buChar char="•"/>
+            </a:pPr>
+            <a:r>
+              <a:rPr lang="en-US" dirty="0"/>
+              <a:t>Lots of color and color variants</a:t>
+            </a:r>
+          </a:p>
+          <a:p>
+            <a:pPr marL="742950" lvl="1" indent="-285750">
+              <a:buFont typeface="Arial" panose="020B0604020202020204" pitchFamily="34" charset="0"/>
+              <a:buChar char="•"/>
+            </a:pPr>
+            <a:r>
+              <a:rPr lang="en-US" dirty="0"/>
+              <a:t>Easy to tell hot from cold from warm</a:t>
+            </a:r>
+          </a:p>
+          <a:p>
+            <a:pPr marL="285750" indent="-285750">
+              <a:buFont typeface="Arial" panose="020B0604020202020204" pitchFamily="34" charset="0"/>
+              <a:buChar char="•"/>
+            </a:pPr>
+            <a:r>
+              <a:rPr lang="en-US" dirty="0"/>
+              <a:t>Great looking gradient between colors</a:t>
+            </a:r>
+          </a:p>
+          <a:p>
+            <a:r>
+              <a:rPr lang="en-US" dirty="0"/>
+              <a:t>Cons:</a:t>
+            </a:r>
+          </a:p>
+          <a:p>
+            <a:pPr marL="285750" indent="-285750">
+              <a:buFont typeface="Arial" panose="020B0604020202020204" pitchFamily="34" charset="0"/>
+              <a:buChar char="•"/>
+            </a:pPr>
+            <a:r>
+              <a:rPr lang="en-US" dirty="0"/>
+              <a:t>None.</a:t>
+            </a:r>
+          </a:p>
+        </p:txBody>
+      </p:sp>
+    </p:spTree>
+    <p:extLst>
+      <p:ext uri="{BB962C8B-B14F-4D97-AF65-F5344CB8AC3E}">
+        <p14:creationId xmlns:p14="http://schemas.microsoft.com/office/powerpoint/2010/main" val="932961816"/>
+      </p:ext>
+    </p:extLst>
+  </p:cSld>
+  <p:clrMapOvr>
+    <a:masterClrMapping/>
+  </p:clrMapOvr>
+</p:sld>
+</file>
+
+<file path=ppt/slides/slide13.xml><?xml version="1.0" encoding="utf-8"?>
+<p:sld xmlns:a="http://schemas.openxmlformats.org/drawingml/2006/main" xmlns:r="http://schemas.openxmlformats.org/officeDocument/2006/relationships" xmlns:p="http://schemas.openxmlformats.org/presentationml/2006/main">
+  <p:cSld>
+    <p:spTree>
+      <p:nvGrpSpPr>
+        <p:cNvPr id="1" name=""/>
+        <p:cNvGrpSpPr/>
+        <p:nvPr/>
+      </p:nvGrpSpPr>
+      <p:grpSpPr>
+        <a:xfrm>
+          <a:off x="0" y="0"/>
+          <a:ext cx="0" cy="0"/>
+          <a:chOff x="0" y="0"/>
+          <a:chExt cx="0" cy="0"/>
+        </a:xfrm>
+      </p:grpSpPr>
+      <p:sp>
+        <p:nvSpPr>
+          <p:cNvPr id="2" name="Title 1"/>
+          <p:cNvSpPr>
+            <a:spLocks noGrp="1"/>
+          </p:cNvSpPr>
+          <p:nvPr>
+            <p:ph type="title"/>
+          </p:nvPr>
+        </p:nvSpPr>
+        <p:spPr/>
+        <p:txBody>
+          <a:bodyPr/>
+          <a:lstStyle/>
+          <a:p>
+            <a:pPr algn="ctr"/>
+            <a:r>
+              <a:rPr lang="en-US" dirty="0"/>
+              <a:t>510 Quadratic RGB Interpolation</a:t>
+            </a:r>
+          </a:p>
+        </p:txBody>
+      </p:sp>
+      <p:pic>
+        <p:nvPicPr>
+          <p:cNvPr id="4" name="Content Placeholder 3"/>
+          <p:cNvPicPr>
+            <a:picLocks noGrp="1" noChangeAspect="1"/>
+          </p:cNvPicPr>
+          <p:nvPr>
+            <p:ph idx="1"/>
+          </p:nvPr>
+        </p:nvPicPr>
+        <p:blipFill>
+          <a:blip r:embed="rId2">
+            <a:extLst>
+              <a:ext uri="{28A0092B-C50C-407E-A947-70E740481C1C}">
+                <a14:useLocalDpi xmlns:a14="http://schemas.microsoft.com/office/drawing/2010/main" val="0"/>
+              </a:ext>
+            </a:extLst>
+          </a:blip>
+          <a:stretch>
+            <a:fillRect/>
+          </a:stretch>
+        </p:blipFill>
+        <p:spPr>
+          <a:xfrm>
+            <a:off x="2837995" y="1690688"/>
+            <a:ext cx="6516009" cy="3410426"/>
+          </a:xfrm>
+        </p:spPr>
+      </p:pic>
+    </p:spTree>
+    <p:extLst>
+      <p:ext uri="{BB962C8B-B14F-4D97-AF65-F5344CB8AC3E}">
+        <p14:creationId xmlns:p14="http://schemas.microsoft.com/office/powerpoint/2010/main" val="2120599663"/>
+      </p:ext>
+    </p:extLst>
+  </p:cSld>
+  <p:clrMapOvr>
+    <a:masterClrMapping/>
+  </p:clrMapOvr>
+</p:sld>
+</file>
+
+<file path=ppt/slides/slide14.xml><?xml version="1.0" encoding="utf-8"?>
+<p:sld xmlns:a="http://schemas.openxmlformats.org/drawingml/2006/main" xmlns:r="http://schemas.openxmlformats.org/officeDocument/2006/relationships" xmlns:p="http://schemas.openxmlformats.org/presentationml/2006/main">
+  <p:cSld>
+    <p:spTree>
+      <p:nvGrpSpPr>
+        <p:cNvPr id="1" name=""/>
+        <p:cNvGrpSpPr/>
+        <p:nvPr/>
+      </p:nvGrpSpPr>
+      <p:grpSpPr>
+        <a:xfrm>
+          <a:off x="0" y="0"/>
+          <a:ext cx="0" cy="0"/>
+          <a:chOff x="0" y="0"/>
+          <a:chExt cx="0" cy="0"/>
+        </a:xfrm>
+      </p:grpSpPr>
+      <p:sp>
+        <p:nvSpPr>
+          <p:cNvPr id="2" name="Title 1"/>
+          <p:cNvSpPr>
+            <a:spLocks noGrp="1"/>
+          </p:cNvSpPr>
+          <p:nvPr>
+            <p:ph type="title"/>
+          </p:nvPr>
+        </p:nvSpPr>
+        <p:spPr/>
+        <p:txBody>
+          <a:bodyPr/>
+          <a:lstStyle/>
+          <a:p>
+            <a:pPr algn="ctr"/>
+            <a:r>
+              <a:rPr lang="en-US" dirty="0"/>
+              <a:t>RGB Gradient Given 3 Celsius Values</a:t>
+            </a:r>
+          </a:p>
+        </p:txBody>
+      </p:sp>
+      <p:sp>
+        <p:nvSpPr>
+          <p:cNvPr id="3" name="Content Placeholder 2"/>
+          <p:cNvSpPr>
+            <a:spLocks noGrp="1"/>
+          </p:cNvSpPr>
+          <p:nvPr>
+            <p:ph idx="1"/>
+          </p:nvPr>
+        </p:nvSpPr>
+        <p:spPr/>
+        <p:txBody>
+          <a:bodyPr/>
+          <a:lstStyle/>
+          <a:p>
+            <a:r>
+              <a:rPr lang="en-US" dirty="0"/>
+              <a:t>Problems</a:t>
+            </a:r>
+          </a:p>
+          <a:p>
+            <a:pPr lvl="1"/>
+            <a:r>
+              <a:rPr lang="en-US" dirty="0"/>
+              <a:t> 510 gradient assumes constant gradient between all 3 points.</a:t>
+            </a:r>
+          </a:p>
+          <a:p>
+            <a:pPr lvl="2"/>
+            <a:r>
+              <a:rPr lang="en-US" dirty="0"/>
+              <a:t>3 Celsius values are (assumed to be) random at any point in time. Therefore the slope between any two points is also random.</a:t>
+            </a:r>
+          </a:p>
+          <a:p>
+            <a:pPr lvl="1"/>
+            <a:r>
+              <a:rPr lang="en-US" dirty="0"/>
+              <a:t>Conversion between Celsius and RGB</a:t>
+            </a:r>
+          </a:p>
+          <a:p>
+            <a:pPr lvl="2"/>
+            <a:r>
+              <a:rPr lang="en-US" dirty="0"/>
+              <a:t>Converting from RGB to “true” RGB from graphs and equations</a:t>
+            </a:r>
+          </a:p>
+          <a:p>
+            <a:pPr marL="0" indent="0">
+              <a:buNone/>
+            </a:pPr>
+            <a:endParaRPr lang="en-US" dirty="0"/>
+          </a:p>
+        </p:txBody>
+      </p:sp>
+    </p:spTree>
+    <p:extLst>
+      <p:ext uri="{BB962C8B-B14F-4D97-AF65-F5344CB8AC3E}">
+        <p14:creationId xmlns:p14="http://schemas.microsoft.com/office/powerpoint/2010/main" val="4193747219"/>
+      </p:ext>
+    </p:extLst>
+  </p:cSld>
+  <p:clrMapOvr>
+    <a:masterClrMapping/>
+  </p:clrMapOvr>
+</p:sld>
+</file>
+
+<file path=ppt/slides/slide15.xml><?xml version="1.0" encoding="utf-8"?>
+<p:sld xmlns:a="http://schemas.openxmlformats.org/drawingml/2006/main" xmlns:r="http://schemas.openxmlformats.org/officeDocument/2006/relationships" xmlns:p="http://schemas.openxmlformats.org/presentationml/2006/main">
+  <p:cSld>
+    <p:spTree>
+      <p:nvGrpSpPr>
+        <p:cNvPr id="1" name=""/>
+        <p:cNvGrpSpPr/>
+        <p:nvPr/>
+      </p:nvGrpSpPr>
+      <p:grpSpPr>
+        <a:xfrm>
+          <a:off x="0" y="0"/>
+          <a:ext cx="0" cy="0"/>
+          <a:chOff x="0" y="0"/>
+          <a:chExt cx="0" cy="0"/>
+        </a:xfrm>
+      </p:grpSpPr>
+      <p:sp>
+        <p:nvSpPr>
+          <p:cNvPr id="2" name="Title 1"/>
+          <p:cNvSpPr>
+            <a:spLocks noGrp="1"/>
+          </p:cNvSpPr>
+          <p:nvPr>
+            <p:ph type="title"/>
+          </p:nvPr>
+        </p:nvSpPr>
+        <p:spPr/>
+        <p:txBody>
+          <a:bodyPr/>
+          <a:lstStyle/>
+          <a:p>
+            <a:pPr algn="ctr"/>
+            <a:r>
+              <a:rPr lang="en-US" dirty="0"/>
+              <a:t>Celsius to RGB Conversion</a:t>
+            </a:r>
+          </a:p>
+        </p:txBody>
+      </p:sp>
+      <p:sp>
+        <p:nvSpPr>
+          <p:cNvPr id="3" name="Content Placeholder 2"/>
+          <p:cNvSpPr>
+            <a:spLocks noGrp="1"/>
+          </p:cNvSpPr>
+          <p:nvPr>
+            <p:ph idx="1"/>
+          </p:nvPr>
+        </p:nvSpPr>
+        <p:spPr/>
+        <p:txBody>
+          <a:bodyPr/>
+          <a:lstStyle/>
+          <a:p>
+            <a:pPr marL="457200" lvl="1" indent="0">
+              <a:buNone/>
+            </a:pPr>
+            <a:endParaRPr lang="en-US" dirty="0"/>
+          </a:p>
+          <a:p>
+            <a:pPr lvl="1"/>
+            <a:r>
+              <a:rPr lang="en-US" dirty="0"/>
+              <a:t>Assumptions:</a:t>
+            </a:r>
+          </a:p>
+          <a:p>
+            <a:pPr lvl="2"/>
+            <a:r>
+              <a:rPr lang="en-US" dirty="0"/>
+              <a:t>Max degree Celsius – 110</a:t>
+            </a:r>
+          </a:p>
+          <a:p>
+            <a:pPr lvl="2"/>
+            <a:r>
+              <a:rPr lang="en-US" dirty="0"/>
+              <a:t>Min degree Celsius – 0</a:t>
+            </a:r>
+          </a:p>
+          <a:p>
+            <a:pPr lvl="1"/>
+            <a:r>
+              <a:rPr lang="en-US" dirty="0"/>
+              <a:t>510 Linear RGB Interpolation</a:t>
+            </a:r>
+          </a:p>
+          <a:p>
+            <a:pPr lvl="2"/>
+            <a:r>
+              <a:rPr lang="en-US" dirty="0"/>
+              <a:t>RGB = (Scaling Factor)(Degree C)</a:t>
+            </a:r>
+          </a:p>
+          <a:p>
+            <a:pPr lvl="2"/>
+            <a:r>
+              <a:rPr lang="en-US" dirty="0"/>
+              <a:t>Scaling Factor is a ratio</a:t>
+            </a:r>
+          </a:p>
+          <a:p>
+            <a:pPr lvl="2"/>
+            <a:r>
+              <a:rPr lang="en-US" dirty="0"/>
+              <a:t>Scaling Factor = #RGB values / #Possible Degree C = 510 / 110</a:t>
+            </a:r>
+          </a:p>
+          <a:p>
+            <a:pPr lvl="2"/>
+            <a:endParaRPr lang="en-US" dirty="0"/>
+          </a:p>
+          <a:p>
+            <a:pPr lvl="2"/>
+            <a:endParaRPr lang="en-US" dirty="0"/>
+          </a:p>
+          <a:p>
+            <a:pPr lvl="1"/>
+            <a:endParaRPr lang="en-US" dirty="0"/>
+          </a:p>
+          <a:p>
+            <a:pPr lvl="1"/>
+            <a:endParaRPr lang="en-US" dirty="0"/>
+          </a:p>
+          <a:p>
+            <a:pPr lvl="1"/>
+            <a:endParaRPr lang="en-US" dirty="0"/>
+          </a:p>
+        </p:txBody>
+      </p:sp>
+    </p:spTree>
+    <p:extLst>
+      <p:ext uri="{BB962C8B-B14F-4D97-AF65-F5344CB8AC3E}">
+        <p14:creationId xmlns:p14="http://schemas.microsoft.com/office/powerpoint/2010/main" val="4272314917"/>
+      </p:ext>
+    </p:extLst>
+  </p:cSld>
+  <p:clrMapOvr>
+    <a:masterClrMapping/>
+  </p:clrMapOvr>
+</p:sld>
+</file>
+
+<file path=ppt/slides/slide16.xml><?xml version="1.0" encoding="utf-8"?>
+<p:sld xmlns:a="http://schemas.openxmlformats.org/drawingml/2006/main" xmlns:r="http://schemas.openxmlformats.org/officeDocument/2006/relationships" xmlns:p="http://schemas.openxmlformats.org/presentationml/2006/main">
+  <p:cSld>
+    <p:spTree>
+      <p:nvGrpSpPr>
+        <p:cNvPr id="1" name=""/>
+        <p:cNvGrpSpPr/>
+        <p:nvPr/>
+      </p:nvGrpSpPr>
+      <p:grpSpPr>
+        <a:xfrm>
+          <a:off x="0" y="0"/>
+          <a:ext cx="0" cy="0"/>
+          <a:chOff x="0" y="0"/>
+          <a:chExt cx="0" cy="0"/>
+        </a:xfrm>
+      </p:grpSpPr>
       <p:sp>
         <p:nvSpPr>
           <p:cNvPr id="2" name="Title 1"/>
@@ -3821,7 +4965,7 @@
 </p:sld>
 </file>
 
-<file path=ppt/slides/slide13.xml><?xml version="1.0" encoding="utf-8"?>
+<file path=ppt/slides/slide17.xml><?xml version="1.0" encoding="utf-8"?>
 <p:sld xmlns:a="http://schemas.openxmlformats.org/drawingml/2006/main" xmlns:r="http://schemas.openxmlformats.org/officeDocument/2006/relationships" xmlns:p="http://schemas.openxmlformats.org/presentationml/2006/main">
   <p:cSld>
     <p:spTree>
@@ -3938,7 +5082,7 @@
             <a:pPr algn="ctr"/>
             <a:r>
               <a:rPr lang="en-US" dirty="0"/>
-              <a:t>Background Information</a:t>
+              <a:t>What is Formula SAE?</a:t>
             </a:r>
           </a:p>
         </p:txBody>
@@ -3953,19 +5097,75 @@
             <p:ph idx="1"/>
           </p:nvPr>
         </p:nvSpPr>
-        <p:spPr/>
-        <p:txBody>
-          <a:bodyPr/>
-          <a:lstStyle/>
-          <a:p>
-            <a:endParaRPr lang="en-US" dirty="0"/>
-          </a:p>
-        </p:txBody>
-      </p:sp>
+        <p:spPr>
+          <a:xfrm>
+            <a:off x="838200" y="1825625"/>
+            <a:ext cx="4596442" cy="4351338"/>
+          </a:xfrm>
+        </p:spPr>
+        <p:txBody>
+          <a:bodyPr/>
+          <a:lstStyle/>
+          <a:p>
+            <a:r>
+              <a:rPr lang="en-US" dirty="0"/>
+              <a:t>Mostly Mechanical, Electrical, Computer Engineering Undergrads</a:t>
+            </a:r>
+          </a:p>
+          <a:p>
+            <a:r>
+              <a:rPr lang="en-US" dirty="0"/>
+              <a:t>Design and manufacture a ¼ scale formula style racecar every year</a:t>
+            </a:r>
+          </a:p>
+          <a:p>
+            <a:r>
+              <a:rPr lang="en-US" dirty="0"/>
+              <a:t>Compete in both driving and engineering design events</a:t>
+            </a:r>
+          </a:p>
+          <a:p>
+            <a:r>
+              <a:rPr lang="en-US" dirty="0"/>
+              <a:t>Headed to competition at FSAE Michigan in 4 days</a:t>
+            </a:r>
+          </a:p>
+        </p:txBody>
+      </p:sp>
+      <p:pic>
+        <p:nvPicPr>
+          <p:cNvPr id="4" name="Content Placeholder 4"/>
+          <p:cNvPicPr>
+            <a:picLocks noChangeAspect="1"/>
+          </p:cNvPicPr>
+          <p:nvPr/>
+        </p:nvPicPr>
+        <p:blipFill>
+          <a:blip r:embed="rId2" cstate="print">
+            <a:extLst>
+              <a:ext uri="{28A0092B-C50C-407E-A947-70E740481C1C}">
+                <a14:useLocalDpi xmlns:a14="http://schemas.microsoft.com/office/drawing/2010/main" val="0"/>
+              </a:ext>
+            </a:extLst>
+          </a:blip>
+          <a:stretch>
+            <a:fillRect/>
+          </a:stretch>
+        </p:blipFill>
+        <p:spPr>
+          <a:xfrm>
+            <a:off x="5500575" y="1825625"/>
+            <a:ext cx="6527007" cy="4351338"/>
+          </a:xfrm>
+          <a:prstGeom prst="rect">
+            <a:avLst/>
+          </a:prstGeom>
+        </p:spPr>
+      </p:pic>
     </p:spTree>
     <p:extLst>
       <p:ext uri="{BB962C8B-B14F-4D97-AF65-F5344CB8AC3E}">
-        <p14:creationId xmlns:p14="http://schemas.microsoft.com/office/powerpoint/2010/main" val="3611849291"/>
+        <p14:creationId xmlns:p14="http://schemas.microsoft.com/office/powerpoint/2010/main" val="1148393630"/>
       </p:ext>
     </p:extLst>
   </p:cSld>
@@ -3994,88 +5194,365 @@
       </p:grpSpPr>
       <p:sp>
         <p:nvSpPr>
-          <p:cNvPr id="10" name="Rectangle 9"/>
-          <p:cNvSpPr>
-            <a:spLocks noGrp="1" noRot="1" noChangeAspect="1" noMove="1" noResize="1" noEditPoints="1" noAdjustHandles="1" noChangeArrowheads="1" noChangeShapeType="1" noTextEdit="1"/>
-          </p:cNvSpPr>
-          <p:nvPr>
-            <p:extLst>
-              <p:ext uri="{386F3935-93C4-4BCD-93E2-E3B085C9AB24}">
-                <p16:designElem xmlns:p16="http://schemas.microsoft.com/office/powerpoint/2015/main" val="1"/>
-              </p:ext>
-            </p:extLst>
-          </p:nvPr>
-        </p:nvSpPr>
-        <p:spPr bwMode="white">
+          <p:cNvPr id="2" name="Title 1"/>
+          <p:cNvSpPr>
+            <a:spLocks noGrp="1"/>
+          </p:cNvSpPr>
+          <p:nvPr>
+            <p:ph type="title"/>
+          </p:nvPr>
+        </p:nvSpPr>
+        <p:spPr/>
+        <p:txBody>
+          <a:bodyPr/>
+          <a:lstStyle/>
+          <a:p>
+            <a:r>
+              <a:rPr lang="en-US" dirty="0"/>
+              <a:t>Tire Temperature Sensors</a:t>
+            </a:r>
+          </a:p>
+        </p:txBody>
+      </p:sp>
+      <p:sp>
+        <p:nvSpPr>
+          <p:cNvPr id="3" name="Content Placeholder 2"/>
+          <p:cNvSpPr>
+            <a:spLocks noGrp="1"/>
+          </p:cNvSpPr>
+          <p:nvPr>
+            <p:ph idx="1"/>
+          </p:nvPr>
+        </p:nvSpPr>
+        <p:spPr>
           <a:xfrm>
-            <a:off x="0" y="0"/>
-            <a:ext cx="12192000" cy="6858000"/>
+            <a:off x="838200" y="1690688"/>
+            <a:ext cx="6076950" cy="4486275"/>
+          </a:xfrm>
+        </p:spPr>
+        <p:txBody>
+          <a:bodyPr/>
+          <a:lstStyle/>
+          <a:p>
+            <a:r>
+              <a:rPr lang="en-US" dirty="0"/>
+              <a:t>Simple, cheap sensors designed by a previous student and used for data acquisition</a:t>
+            </a:r>
+          </a:p>
+          <a:p>
+            <a:r>
+              <a:rPr lang="en-US" dirty="0"/>
+              <a:t>Important to ensure suspension is acting properly and the tire is being properly utilized</a:t>
+            </a:r>
+          </a:p>
+          <a:p>
+            <a:r>
+              <a:rPr lang="en-US" dirty="0"/>
+              <a:t>Raw data is acquired via the car’s datalogging system but is difficult to interpret</a:t>
+            </a:r>
+          </a:p>
+        </p:txBody>
+      </p:sp>
+      <p:pic>
+        <p:nvPicPr>
+          <p:cNvPr id="1026" name="Picture 2" descr="https://i.ytimg.com/vi/YcNStXDauRU/maxresdefault.jpg"/>
+          <p:cNvPicPr>
+            <a:picLocks noChangeAspect="1" noChangeArrowheads="1"/>
+          </p:cNvPicPr>
+          <p:nvPr/>
+        </p:nvPicPr>
+        <p:blipFill>
+          <a:blip r:embed="rId2" cstate="print">
+            <a:extLst>
+              <a:ext uri="{28A0092B-C50C-407E-A947-70E740481C1C}">
+                <a14:useLocalDpi xmlns:a14="http://schemas.microsoft.com/office/drawing/2010/main" val="0"/>
+              </a:ext>
+            </a:extLst>
+          </a:blip>
+          <a:srcRect/>
+          <a:stretch>
+            <a:fillRect/>
+          </a:stretch>
+        </p:blipFill>
+        <p:spPr bwMode="auto">
+          <a:xfrm>
+            <a:off x="7191375" y="257174"/>
+            <a:ext cx="4438650" cy="2219325"/>
           </a:xfrm>
           <a:prstGeom prst="rect">
             <a:avLst/>
           </a:prstGeom>
-          <a:solidFill>
-            <a:schemeClr val="bg1"/>
-          </a:solidFill>
-          <a:ln>
-            <a:noFill/>
-          </a:ln>
-          <a:effectLst/>
+          <a:noFill/>
+          <a:extLst>
+            <a:ext uri="{909E8E84-426E-40DD-AFC4-6F175D3DCCD1}">
+              <a14:hiddenFill xmlns:a14="http://schemas.microsoft.com/office/drawing/2010/main">
+                <a:solidFill>
+                  <a:srgbClr val="FFFFFF"/>
+                </a:solidFill>
+              </a14:hiddenFill>
+            </a:ext>
+          </a:extLst>
         </p:spPr>
-      </p:sp>
-      <p:sp>
-        <p:nvSpPr>
-          <p:cNvPr id="12" name="Rectangle 11"/>
-          <p:cNvSpPr>
-            <a:spLocks noGrp="1" noRot="1" noChangeAspect="1" noMove="1" noResize="1" noEditPoints="1" noAdjustHandles="1" noChangeArrowheads="1" noChangeShapeType="1" noTextEdit="1"/>
-          </p:cNvSpPr>
-          <p:nvPr>
-            <p:extLst>
-              <p:ext uri="{386F3935-93C4-4BCD-93E2-E3B085C9AB24}">
-                <p16:designElem xmlns:p16="http://schemas.microsoft.com/office/powerpoint/2015/main" val="1"/>
-              </p:ext>
-            </p:extLst>
-          </p:nvPr>
+      </p:pic>
+      <p:sp>
+        <p:nvSpPr>
+          <p:cNvPr id="5" name="TextBox 4"/>
+          <p:cNvSpPr txBox="1"/>
+          <p:nvPr/>
         </p:nvSpPr>
         <p:spPr>
           <a:xfrm>
-            <a:off x="0" y="651752"/>
-            <a:ext cx="12192000" cy="736551"/>
+            <a:off x="8629650" y="2500072"/>
+            <a:ext cx="2533650" cy="369332"/>
           </a:xfrm>
           <a:prstGeom prst="rect">
             <a:avLst/>
           </a:prstGeom>
-          <a:solidFill>
-            <a:schemeClr val="tx1">
-              <a:alpha val="75000"/>
-            </a:schemeClr>
-          </a:solidFill>
-          <a:ln>
-            <a:noFill/>
-          </a:ln>
+          <a:noFill/>
         </p:spPr>
-        <p:style>
-          <a:lnRef idx="2">
-            <a:schemeClr val="accent1">
-              <a:shade val="50000"/>
-            </a:schemeClr>
-          </a:lnRef>
-          <a:fillRef idx="1">
-            <a:schemeClr val="accent1"/>
-          </a:fillRef>
-          <a:effectRef idx="0">
-            <a:schemeClr val="accent1"/>
-          </a:effectRef>
-          <a:fontRef idx="minor">
-            <a:schemeClr val="lt1"/>
-          </a:fontRef>
-        </p:style>
-        <p:txBody>
-          <a:bodyPr rtlCol="0" anchor="ctr"/>
-          <a:lstStyle/>
-          <a:p>
-            <a:pPr algn="ctr"/>
-            <a:endParaRPr lang="en-US"/>
+        <p:txBody>
+          <a:bodyPr wrap="square" rtlCol="0">
+            <a:spAutoFit/>
+          </a:bodyPr>
+          <a:lstStyle/>
+          <a:p>
+            <a:r>
+              <a:rPr lang="en-US" i="1" dirty="0"/>
+              <a:t>Formula 1 IR Cameras</a:t>
+            </a:r>
+          </a:p>
+        </p:txBody>
+      </p:sp>
+      <p:pic>
+        <p:nvPicPr>
+          <p:cNvPr id="6" name="Picture 5"/>
+          <p:cNvPicPr>
+            <a:picLocks noChangeAspect="1"/>
+          </p:cNvPicPr>
+          <p:nvPr/>
+        </p:nvPicPr>
+        <p:blipFill>
+          <a:blip r:embed="rId3"/>
+          <a:stretch>
+            <a:fillRect/>
+          </a:stretch>
+        </p:blipFill>
+        <p:spPr>
+          <a:xfrm>
+            <a:off x="6848474" y="3109117"/>
+            <a:ext cx="5019675" cy="811763"/>
+          </a:xfrm>
+          <a:prstGeom prst="rect">
+            <a:avLst/>
+          </a:prstGeom>
+        </p:spPr>
+      </p:pic>
+      <p:sp>
+        <p:nvSpPr>
+          <p:cNvPr id="7" name="TextBox 6"/>
+          <p:cNvSpPr txBox="1"/>
+          <p:nvPr/>
+        </p:nvSpPr>
+        <p:spPr>
+          <a:xfrm>
+            <a:off x="7843837" y="6391275"/>
+            <a:ext cx="4105275" cy="369332"/>
+          </a:xfrm>
+          <a:prstGeom prst="rect">
+            <a:avLst/>
+          </a:prstGeom>
+          <a:noFill/>
+        </p:spPr>
+        <p:txBody>
+          <a:bodyPr wrap="square" rtlCol="0">
+            <a:spAutoFit/>
+          </a:bodyPr>
+          <a:lstStyle/>
+          <a:p>
+            <a:r>
+              <a:rPr lang="en-US" i="1" dirty="0"/>
+              <a:t>Mizzou Racing Tire Temp Sensors</a:t>
+            </a:r>
+          </a:p>
+        </p:txBody>
+      </p:sp>
+      <p:sp>
+        <p:nvSpPr>
+          <p:cNvPr id="8" name="TextBox 7"/>
+          <p:cNvSpPr txBox="1"/>
+          <p:nvPr/>
+        </p:nvSpPr>
+        <p:spPr>
+          <a:xfrm>
+            <a:off x="8505646" y="4692978"/>
+            <a:ext cx="2372264" cy="646331"/>
+          </a:xfrm>
+          <a:prstGeom prst="rect">
+            <a:avLst/>
+          </a:prstGeom>
+          <a:noFill/>
+        </p:spPr>
+        <p:txBody>
+          <a:bodyPr wrap="square" rtlCol="0">
+            <a:spAutoFit/>
+          </a:bodyPr>
+          <a:lstStyle/>
+          <a:p>
+            <a:r>
+              <a:rPr lang="en-US" dirty="0"/>
+              <a:t>SOLIDWORKS SCREENSHOT</a:t>
+            </a:r>
+          </a:p>
+        </p:txBody>
+      </p:sp>
+    </p:spTree>
+    <p:extLst>
+      <p:ext uri="{BB962C8B-B14F-4D97-AF65-F5344CB8AC3E}">
+        <p14:creationId xmlns:p14="http://schemas.microsoft.com/office/powerpoint/2010/main" val="1119168782"/>
+      </p:ext>
+    </p:extLst>
+  </p:cSld>
+  <p:clrMapOvr>
+    <a:masterClrMapping/>
+  </p:clrMapOvr>
+</p:sld>
+</file>
+
+<file path=ppt/slides/slide4.xml><?xml version="1.0" encoding="utf-8"?>
+<p:sld xmlns:a="http://schemas.openxmlformats.org/drawingml/2006/main" xmlns:r="http://schemas.openxmlformats.org/officeDocument/2006/relationships" xmlns:p="http://schemas.openxmlformats.org/presentationml/2006/main">
+  <p:cSld>
+    <p:spTree>
+      <p:nvGrpSpPr>
+        <p:cNvPr id="1" name=""/>
+        <p:cNvGrpSpPr/>
+        <p:nvPr/>
+      </p:nvGrpSpPr>
+      <p:grpSpPr>
+        <a:xfrm>
+          <a:off x="0" y="0"/>
+          <a:ext cx="0" cy="0"/>
+          <a:chOff x="0" y="0"/>
+          <a:chExt cx="0" cy="0"/>
+        </a:xfrm>
+      </p:grpSpPr>
+      <p:sp>
+        <p:nvSpPr>
+          <p:cNvPr id="2" name="Title 1"/>
+          <p:cNvSpPr>
+            <a:spLocks noGrp="1"/>
+          </p:cNvSpPr>
+          <p:nvPr>
+            <p:ph type="title"/>
+          </p:nvPr>
+        </p:nvSpPr>
+        <p:spPr/>
+        <p:txBody>
+          <a:bodyPr/>
+          <a:lstStyle/>
+          <a:p>
+            <a:r>
+              <a:rPr lang="en-US" dirty="0"/>
+              <a:t>Implementation</a:t>
+            </a:r>
+          </a:p>
+        </p:txBody>
+      </p:sp>
+      <p:sp>
+        <p:nvSpPr>
+          <p:cNvPr id="3" name="Content Placeholder 2"/>
+          <p:cNvSpPr>
+            <a:spLocks noGrp="1"/>
+          </p:cNvSpPr>
+          <p:nvPr>
+            <p:ph idx="1"/>
+          </p:nvPr>
+        </p:nvSpPr>
+        <p:spPr/>
+        <p:txBody>
+          <a:bodyPr/>
+          <a:lstStyle/>
+          <a:p>
+            <a:r>
+              <a:rPr lang="en-US" dirty="0"/>
+              <a:t>Simple, easy to code graphics package</a:t>
+            </a:r>
+          </a:p>
+          <a:p>
+            <a:r>
+              <a:rPr lang="en-US" dirty="0"/>
+              <a:t>Data smoothing and filtering algorithms</a:t>
+            </a:r>
+          </a:p>
+          <a:p>
+            <a:r>
+              <a:rPr lang="en-US" dirty="0"/>
+              <a:t>Expandability, so project can be added onto in the future to make it more useful</a:t>
+            </a:r>
+          </a:p>
+          <a:p>
+            <a:pPr lvl="1"/>
+            <a:r>
+              <a:rPr lang="en-US" dirty="0"/>
+              <a:t>Integrate concepts outside the scope of this course</a:t>
+            </a:r>
+          </a:p>
+          <a:p>
+            <a:r>
+              <a:rPr lang="en-US" dirty="0"/>
+              <a:t>View logged data and also form a basis for real time telemetry</a:t>
+            </a:r>
+          </a:p>
+        </p:txBody>
+      </p:sp>
+    </p:spTree>
+    <p:extLst>
+      <p:ext uri="{BB962C8B-B14F-4D97-AF65-F5344CB8AC3E}">
+        <p14:creationId xmlns:p14="http://schemas.microsoft.com/office/powerpoint/2010/main" val="1607775491"/>
+      </p:ext>
+    </p:extLst>
+  </p:cSld>
+  <p:clrMapOvr>
+    <a:masterClrMapping/>
+  </p:clrMapOvr>
+</p:sld>
+</file>
+
+<file path=ppt/slides/slide5.xml><?xml version="1.0" encoding="utf-8"?>
+<p:sld xmlns:a="http://schemas.openxmlformats.org/drawingml/2006/main" xmlns:r="http://schemas.openxmlformats.org/officeDocument/2006/relationships" xmlns:p="http://schemas.openxmlformats.org/presentationml/2006/main">
+  <p:cSld>
+    <p:spTree>
+      <p:nvGrpSpPr>
+        <p:cNvPr id="1" name=""/>
+        <p:cNvGrpSpPr/>
+        <p:nvPr/>
+      </p:nvGrpSpPr>
+      <p:grpSpPr>
+        <a:xfrm>
+          <a:off x="0" y="0"/>
+          <a:ext cx="0" cy="0"/>
+          <a:chOff x="0" y="0"/>
+          <a:chExt cx="0" cy="0"/>
+        </a:xfrm>
+      </p:grpSpPr>
+      <p:sp>
+        <p:nvSpPr>
+          <p:cNvPr id="2" name="Title 1"/>
+          <p:cNvSpPr>
+            <a:spLocks noGrp="1"/>
+          </p:cNvSpPr>
+          <p:nvPr>
+            <p:ph type="title"/>
+          </p:nvPr>
+        </p:nvSpPr>
+        <p:spPr/>
+        <p:txBody>
+          <a:bodyPr/>
+          <a:lstStyle/>
+          <a:p>
+            <a:r>
+              <a:rPr lang="en-US" dirty="0"/>
+              <a:t>Graphics</a:t>
+            </a:r>
           </a:p>
         </p:txBody>
       </p:sp>
@@ -4090,7 +5567,7 @@
           </p:nvPr>
         </p:nvPicPr>
         <p:blipFill>
-          <a:blip r:embed="rId2" cstate="print">
+          <a:blip r:embed="rId2">
             <a:extLst>
               <a:ext uri="{28A0092B-C50C-407E-A947-70E740481C1C}">
                 <a14:useLocalDpi xmlns:a14="http://schemas.microsoft.com/office/drawing/2010/main" val="0"/>
@@ -4103,47 +5580,375 @@
         </p:blipFill>
         <p:spPr>
           <a:xfrm>
-            <a:off x="2486843" y="1684558"/>
-            <a:ext cx="7348877" cy="5658634"/>
+            <a:off x="3588960" y="1554110"/>
+            <a:ext cx="1022274" cy="547647"/>
+          </a:xfrm>
+        </p:spPr>
+      </p:pic>
+      <p:pic>
+        <p:nvPicPr>
+          <p:cNvPr id="7" name="Picture 6"/>
+          <p:cNvPicPr>
+            <a:picLocks noChangeAspect="1"/>
+          </p:cNvPicPr>
+          <p:nvPr/>
+        </p:nvPicPr>
+        <p:blipFill>
+          <a:blip r:embed="rId3">
+            <a:extLst>
+              <a:ext uri="{28A0092B-C50C-407E-A947-70E740481C1C}">
+                <a14:useLocalDpi xmlns:a14="http://schemas.microsoft.com/office/drawing/2010/main" val="0"/>
+              </a:ext>
+            </a:extLst>
+          </a:blip>
+          <a:stretch>
+            <a:fillRect/>
+          </a:stretch>
+        </p:blipFill>
+        <p:spPr>
+          <a:xfrm>
+            <a:off x="443372" y="1538502"/>
+            <a:ext cx="2867425" cy="990738"/>
           </a:xfrm>
           <a:prstGeom prst="rect">
             <a:avLst/>
           </a:prstGeom>
         </p:spPr>
       </p:pic>
-      <p:sp>
-        <p:nvSpPr>
-          <p:cNvPr id="2" name="Title 1"/>
-          <p:cNvSpPr>
-            <a:spLocks noGrp="1"/>
-          </p:cNvSpPr>
-          <p:nvPr>
-            <p:ph type="title"/>
-          </p:nvPr>
-        </p:nvSpPr>
+      <p:pic>
+        <p:nvPicPr>
+          <p:cNvPr id="9" name="Picture 8"/>
+          <p:cNvPicPr>
+            <a:picLocks noChangeAspect="1"/>
+          </p:cNvPicPr>
+          <p:nvPr/>
+        </p:nvPicPr>
+        <p:blipFill>
+          <a:blip r:embed="rId4">
+            <a:extLst>
+              <a:ext uri="{28A0092B-C50C-407E-A947-70E740481C1C}">
+                <a14:useLocalDpi xmlns:a14="http://schemas.microsoft.com/office/drawing/2010/main" val="0"/>
+              </a:ext>
+            </a:extLst>
+          </a:blip>
+          <a:stretch>
+            <a:fillRect/>
+          </a:stretch>
+        </p:blipFill>
         <p:spPr>
           <a:xfrm>
-            <a:off x="556532" y="643467"/>
-            <a:ext cx="11210925" cy="744836"/>
+            <a:off x="934542" y="2605648"/>
+            <a:ext cx="2133898" cy="857370"/>
           </a:xfrm>
+          <a:prstGeom prst="rect">
+            <a:avLst/>
+          </a:prstGeom>
         </p:spPr>
-        <p:txBody>
-          <a:bodyPr vert="horz" lIns="91440" tIns="45720" rIns="91440" bIns="45720" rtlCol="0" anchor="ctr">
+      </p:pic>
+      <p:pic>
+        <p:nvPicPr>
+          <p:cNvPr id="11" name="Picture 10"/>
+          <p:cNvPicPr>
+            <a:picLocks noChangeAspect="1"/>
+          </p:cNvPicPr>
+          <p:nvPr/>
+        </p:nvPicPr>
+        <p:blipFill>
+          <a:blip r:embed="rId5">
+            <a:extLst>
+              <a:ext uri="{28A0092B-C50C-407E-A947-70E740481C1C}">
+                <a14:useLocalDpi xmlns:a14="http://schemas.microsoft.com/office/drawing/2010/main" val="0"/>
+              </a:ext>
+            </a:extLst>
+          </a:blip>
+          <a:stretch>
+            <a:fillRect/>
+          </a:stretch>
+        </p:blipFill>
+        <p:spPr>
+          <a:xfrm>
+            <a:off x="576249" y="3702617"/>
+            <a:ext cx="2601670" cy="648035"/>
+          </a:xfrm>
+          <a:prstGeom prst="rect">
+            <a:avLst/>
+          </a:prstGeom>
+        </p:spPr>
+      </p:pic>
+      <p:sp>
+        <p:nvSpPr>
+          <p:cNvPr id="12" name="TextBox 11"/>
+          <p:cNvSpPr txBox="1"/>
+          <p:nvPr/>
+        </p:nvSpPr>
+        <p:spPr>
+          <a:xfrm>
+            <a:off x="576249" y="4451729"/>
+            <a:ext cx="2867913" cy="369332"/>
+          </a:xfrm>
+          <a:prstGeom prst="rect">
+            <a:avLst/>
+          </a:prstGeom>
+          <a:noFill/>
+        </p:spPr>
+        <p:txBody>
+          <a:bodyPr wrap="square" rtlCol="0">
+            <a:spAutoFit/>
+          </a:bodyPr>
+          <a:lstStyle/>
+          <a:p>
+            <a:r>
+              <a:rPr lang="en-US" i="1" dirty="0"/>
+              <a:t>Iterations of color gradients </a:t>
+            </a:r>
+          </a:p>
+        </p:txBody>
+      </p:sp>
+      <p:sp>
+        <p:nvSpPr>
+          <p:cNvPr id="13" name="Content Placeholder 2"/>
+          <p:cNvSpPr txBox="1">
+            <a:spLocks/>
+          </p:cNvSpPr>
+          <p:nvPr/>
+        </p:nvSpPr>
+        <p:spPr>
+          <a:xfrm>
+            <a:off x="5156464" y="1286950"/>
+            <a:ext cx="6076950" cy="4486275"/>
+          </a:xfrm>
+          <a:prstGeom prst="rect">
+            <a:avLst/>
+          </a:prstGeom>
+        </p:spPr>
+        <p:txBody>
+          <a:bodyPr vert="horz" lIns="91440" tIns="45720" rIns="91440" bIns="45720" rtlCol="0">
             <a:normAutofit/>
           </a:bodyPr>
-          <a:lstStyle/>
-          <a:p>
-            <a:pPr algn="ctr"/>
-            <a:r>
-              <a:rPr lang="en-US" sz="3200" kern="1200">
+          <a:lstStyle>
+            <a:lvl1pPr marL="228600" indent="-228600" algn="l" defTabSz="914400" rtl="0" eaLnBrk="1" latinLnBrk="0" hangingPunct="1">
+              <a:lnSpc>
+                <a:spcPct val="90000"/>
+              </a:lnSpc>
+              <a:spcBef>
+                <a:spcPts val="1000"/>
+              </a:spcBef>
+              <a:buFont typeface="Arial" panose="020B0604020202020204" pitchFamily="34" charset="0"/>
+              <a:buChar char="•"/>
+              <a:defRPr sz="2800" kern="1200">
                 <a:solidFill>
-                  <a:schemeClr val="bg1"/>
+                  <a:schemeClr val="tx1"/>
                 </a:solidFill>
-                <a:latin typeface="+mj-lt"/>
-                <a:ea typeface="+mj-ea"/>
-                <a:cs typeface="+mj-cs"/>
-              </a:rPr>
-              <a:t>The Vision</a:t>
+                <a:latin typeface="+mn-lt"/>
+                <a:ea typeface="+mn-ea"/>
+                <a:cs typeface="+mn-cs"/>
+              </a:defRPr>
+            </a:lvl1pPr>
+            <a:lvl2pPr marL="685800" indent="-228600" algn="l" defTabSz="914400" rtl="0" eaLnBrk="1" latinLnBrk="0" hangingPunct="1">
+              <a:lnSpc>
+                <a:spcPct val="90000"/>
+              </a:lnSpc>
+              <a:spcBef>
+                <a:spcPts val="500"/>
+              </a:spcBef>
+              <a:buFont typeface="Arial" panose="020B0604020202020204" pitchFamily="34" charset="0"/>
+              <a:buChar char="•"/>
+              <a:defRPr sz="2400" kern="1200">
+                <a:solidFill>
+                  <a:schemeClr val="tx1"/>
+                </a:solidFill>
+                <a:latin typeface="+mn-lt"/>
+                <a:ea typeface="+mn-ea"/>
+                <a:cs typeface="+mn-cs"/>
+              </a:defRPr>
+            </a:lvl2pPr>
+            <a:lvl3pPr marL="1143000" indent="-228600" algn="l" defTabSz="914400" rtl="0" eaLnBrk="1" latinLnBrk="0" hangingPunct="1">
+              <a:lnSpc>
+                <a:spcPct val="90000"/>
+              </a:lnSpc>
+              <a:spcBef>
+                <a:spcPts val="500"/>
+              </a:spcBef>
+              <a:buFont typeface="Arial" panose="020B0604020202020204" pitchFamily="34" charset="0"/>
+              <a:buChar char="•"/>
+              <a:defRPr sz="2000" kern="1200">
+                <a:solidFill>
+                  <a:schemeClr val="tx1"/>
+                </a:solidFill>
+                <a:latin typeface="+mn-lt"/>
+                <a:ea typeface="+mn-ea"/>
+                <a:cs typeface="+mn-cs"/>
+              </a:defRPr>
+            </a:lvl3pPr>
+            <a:lvl4pPr marL="1600200" indent="-228600" algn="l" defTabSz="914400" rtl="0" eaLnBrk="1" latinLnBrk="0" hangingPunct="1">
+              <a:lnSpc>
+                <a:spcPct val="90000"/>
+              </a:lnSpc>
+              <a:spcBef>
+                <a:spcPts val="500"/>
+              </a:spcBef>
+              <a:buFont typeface="Arial" panose="020B0604020202020204" pitchFamily="34" charset="0"/>
+              <a:buChar char="•"/>
+              <a:defRPr sz="1800" kern="1200">
+                <a:solidFill>
+                  <a:schemeClr val="tx1"/>
+                </a:solidFill>
+                <a:latin typeface="+mn-lt"/>
+                <a:ea typeface="+mn-ea"/>
+                <a:cs typeface="+mn-cs"/>
+              </a:defRPr>
+            </a:lvl4pPr>
+            <a:lvl5pPr marL="2057400" indent="-228600" algn="l" defTabSz="914400" rtl="0" eaLnBrk="1" latinLnBrk="0" hangingPunct="1">
+              <a:lnSpc>
+                <a:spcPct val="90000"/>
+              </a:lnSpc>
+              <a:spcBef>
+                <a:spcPts val="500"/>
+              </a:spcBef>
+              <a:buFont typeface="Arial" panose="020B0604020202020204" pitchFamily="34" charset="0"/>
+              <a:buChar char="•"/>
+              <a:defRPr sz="1800" kern="1200">
+                <a:solidFill>
+                  <a:schemeClr val="tx1"/>
+                </a:solidFill>
+                <a:latin typeface="+mn-lt"/>
+                <a:ea typeface="+mn-ea"/>
+                <a:cs typeface="+mn-cs"/>
+              </a:defRPr>
+            </a:lvl5pPr>
+            <a:lvl6pPr marL="2514600" indent="-228600" algn="l" defTabSz="914400" rtl="0" eaLnBrk="1" latinLnBrk="0" hangingPunct="1">
+              <a:lnSpc>
+                <a:spcPct val="90000"/>
+              </a:lnSpc>
+              <a:spcBef>
+                <a:spcPts val="500"/>
+              </a:spcBef>
+              <a:buFont typeface="Arial" panose="020B0604020202020204" pitchFamily="34" charset="0"/>
+              <a:buChar char="•"/>
+              <a:defRPr sz="1800" kern="1200">
+                <a:solidFill>
+                  <a:schemeClr val="tx1"/>
+                </a:solidFill>
+                <a:latin typeface="+mn-lt"/>
+                <a:ea typeface="+mn-ea"/>
+                <a:cs typeface="+mn-cs"/>
+              </a:defRPr>
+            </a:lvl6pPr>
+            <a:lvl7pPr marL="2971800" indent="-228600" algn="l" defTabSz="914400" rtl="0" eaLnBrk="1" latinLnBrk="0" hangingPunct="1">
+              <a:lnSpc>
+                <a:spcPct val="90000"/>
+              </a:lnSpc>
+              <a:spcBef>
+                <a:spcPts val="500"/>
+              </a:spcBef>
+              <a:buFont typeface="Arial" panose="020B0604020202020204" pitchFamily="34" charset="0"/>
+              <a:buChar char="•"/>
+              <a:defRPr sz="1800" kern="1200">
+                <a:solidFill>
+                  <a:schemeClr val="tx1"/>
+                </a:solidFill>
+                <a:latin typeface="+mn-lt"/>
+                <a:ea typeface="+mn-ea"/>
+                <a:cs typeface="+mn-cs"/>
+              </a:defRPr>
+            </a:lvl7pPr>
+            <a:lvl8pPr marL="3429000" indent="-228600" algn="l" defTabSz="914400" rtl="0" eaLnBrk="1" latinLnBrk="0" hangingPunct="1">
+              <a:lnSpc>
+                <a:spcPct val="90000"/>
+              </a:lnSpc>
+              <a:spcBef>
+                <a:spcPts val="500"/>
+              </a:spcBef>
+              <a:buFont typeface="Arial" panose="020B0604020202020204" pitchFamily="34" charset="0"/>
+              <a:buChar char="•"/>
+              <a:defRPr sz="1800" kern="1200">
+                <a:solidFill>
+                  <a:schemeClr val="tx1"/>
+                </a:solidFill>
+                <a:latin typeface="+mn-lt"/>
+                <a:ea typeface="+mn-ea"/>
+                <a:cs typeface="+mn-cs"/>
+              </a:defRPr>
+            </a:lvl8pPr>
+            <a:lvl9pPr marL="3886200" indent="-228600" algn="l" defTabSz="914400" rtl="0" eaLnBrk="1" latinLnBrk="0" hangingPunct="1">
+              <a:lnSpc>
+                <a:spcPct val="90000"/>
+              </a:lnSpc>
+              <a:spcBef>
+                <a:spcPts val="500"/>
+              </a:spcBef>
+              <a:buFont typeface="Arial" panose="020B0604020202020204" pitchFamily="34" charset="0"/>
+              <a:buChar char="•"/>
+              <a:defRPr sz="1800" kern="1200">
+                <a:solidFill>
+                  <a:schemeClr val="tx1"/>
+                </a:solidFill>
+                <a:latin typeface="+mn-lt"/>
+                <a:ea typeface="+mn-ea"/>
+                <a:cs typeface="+mn-cs"/>
+              </a:defRPr>
+            </a:lvl9pPr>
+          </a:lstStyle>
+          <a:p>
+            <a:r>
+              <a:rPr lang="en-US" dirty="0"/>
+              <a:t>Implemented using a built-in </a:t>
+            </a:r>
+            <a:r>
+              <a:rPr lang="en-US" dirty="0" err="1"/>
+              <a:t>windows.h</a:t>
+            </a:r>
+            <a:r>
+              <a:rPr lang="en-US" dirty="0"/>
+              <a:t> library</a:t>
+            </a:r>
+          </a:p>
+          <a:p>
+            <a:r>
+              <a:rPr lang="en-US" dirty="0"/>
+              <a:t>Very simple to use as a proof of concept</a:t>
+            </a:r>
+          </a:p>
+          <a:p>
+            <a:pPr lvl="1"/>
+            <a:r>
+              <a:rPr lang="en-US" dirty="0"/>
+              <a:t>A more complex graphics package may be implemented in the future</a:t>
+            </a:r>
+          </a:p>
+          <a:p>
+            <a:r>
+              <a:rPr lang="en-US" dirty="0"/>
+              <a:t>Color gradients were created using 510 and 1020 RGB algorithms</a:t>
+            </a:r>
+          </a:p>
+        </p:txBody>
+      </p:sp>
+      <p:sp>
+        <p:nvSpPr>
+          <p:cNvPr id="14" name="TextBox 13"/>
+          <p:cNvSpPr txBox="1"/>
+          <p:nvPr/>
+        </p:nvSpPr>
+        <p:spPr>
+          <a:xfrm>
+            <a:off x="5270740" y="5011947"/>
+            <a:ext cx="5477773" cy="369332"/>
+          </a:xfrm>
+          <a:prstGeom prst="rect">
+            <a:avLst/>
+          </a:prstGeom>
+          <a:noFill/>
+        </p:spPr>
+        <p:txBody>
+          <a:bodyPr wrap="square" rtlCol="0">
+            <a:spAutoFit/>
+          </a:bodyPr>
+          <a:lstStyle/>
+          <a:p>
+            <a:r>
+              <a:rPr lang="en-US" dirty="0"/>
+              <a:t>SCREENSHOT OF FINAL PRODUCT</a:t>
             </a:r>
           </a:p>
         </p:txBody>
@@ -4151,7 +5956,7 @@
     </p:spTree>
     <p:extLst>
       <p:ext uri="{BB962C8B-B14F-4D97-AF65-F5344CB8AC3E}">
-        <p14:creationId xmlns:p14="http://schemas.microsoft.com/office/powerpoint/2010/main" val="1241085697"/>
+        <p14:creationId xmlns:p14="http://schemas.microsoft.com/office/powerpoint/2010/main" val="2707014097"/>
       </p:ext>
     </p:extLst>
   </p:cSld>
@@ -4161,7 +5966,172 @@
 </p:sld>
 </file>
 
-<file path=ppt/slides/slide4.xml><?xml version="1.0" encoding="utf-8"?>
+<file path=ppt/slides/slide6.xml><?xml version="1.0" encoding="utf-8"?>
+<p:sld xmlns:a="http://schemas.openxmlformats.org/drawingml/2006/main" xmlns:r="http://schemas.openxmlformats.org/officeDocument/2006/relationships" xmlns:p="http://schemas.openxmlformats.org/presentationml/2006/main">
+  <p:cSld>
+    <p:spTree>
+      <p:nvGrpSpPr>
+        <p:cNvPr id="1" name=""/>
+        <p:cNvGrpSpPr/>
+        <p:nvPr/>
+      </p:nvGrpSpPr>
+      <p:grpSpPr>
+        <a:xfrm>
+          <a:off x="0" y="0"/>
+          <a:ext cx="0" cy="0"/>
+          <a:chOff x="0" y="0"/>
+          <a:chExt cx="0" cy="0"/>
+        </a:xfrm>
+      </p:grpSpPr>
+      <p:sp>
+        <p:nvSpPr>
+          <p:cNvPr id="2" name="Title 1"/>
+          <p:cNvSpPr>
+            <a:spLocks noGrp="1"/>
+          </p:cNvSpPr>
+          <p:nvPr>
+            <p:ph type="title"/>
+          </p:nvPr>
+        </p:nvSpPr>
+        <p:spPr/>
+        <p:txBody>
+          <a:bodyPr/>
+          <a:lstStyle/>
+          <a:p>
+            <a:r>
+              <a:rPr lang="en-US" dirty="0"/>
+              <a:t>Data Filtering</a:t>
+            </a:r>
+          </a:p>
+        </p:txBody>
+      </p:sp>
+      <p:sp>
+        <p:nvSpPr>
+          <p:cNvPr id="3" name="Content Placeholder 2"/>
+          <p:cNvSpPr>
+            <a:spLocks noGrp="1"/>
+          </p:cNvSpPr>
+          <p:nvPr>
+            <p:ph idx="1"/>
+          </p:nvPr>
+        </p:nvSpPr>
+        <p:spPr/>
+        <p:txBody>
+          <a:bodyPr/>
+          <a:lstStyle/>
+          <a:p>
+            <a:r>
+              <a:rPr lang="en-US" dirty="0"/>
+              <a:t>Several approaches were implemented and tested</a:t>
+            </a:r>
+          </a:p>
+          <a:p>
+            <a:pPr lvl="1"/>
+            <a:r>
+              <a:rPr lang="en-US" dirty="0"/>
+              <a:t>Buffered averaging</a:t>
+            </a:r>
+          </a:p>
+          <a:p>
+            <a:pPr lvl="1"/>
+            <a:r>
+              <a:rPr lang="en-US" dirty="0"/>
+              <a:t>Linear interpolation</a:t>
+            </a:r>
+          </a:p>
+          <a:p>
+            <a:r>
+              <a:rPr lang="en-US" dirty="0"/>
+              <a:t>Smooth out erroneous data and make the graphics look nicer, while still maintaining meaningful data</a:t>
+            </a:r>
+          </a:p>
+        </p:txBody>
+      </p:sp>
+    </p:spTree>
+    <p:extLst>
+      <p:ext uri="{BB962C8B-B14F-4D97-AF65-F5344CB8AC3E}">
+        <p14:creationId xmlns:p14="http://schemas.microsoft.com/office/powerpoint/2010/main" val="4265326637"/>
+      </p:ext>
+    </p:extLst>
+  </p:cSld>
+  <p:clrMapOvr>
+    <a:masterClrMapping/>
+  </p:clrMapOvr>
+</p:sld>
+</file>
+
+<file path=ppt/slides/slide7.xml><?xml version="1.0" encoding="utf-8"?>
+<p:sld xmlns:a="http://schemas.openxmlformats.org/drawingml/2006/main" xmlns:r="http://schemas.openxmlformats.org/officeDocument/2006/relationships" xmlns:p="http://schemas.openxmlformats.org/presentationml/2006/main">
+  <p:cSld>
+    <p:spTree>
+      <p:nvGrpSpPr>
+        <p:cNvPr id="1" name=""/>
+        <p:cNvGrpSpPr/>
+        <p:nvPr/>
+      </p:nvGrpSpPr>
+      <p:grpSpPr>
+        <a:xfrm>
+          <a:off x="0" y="0"/>
+          <a:ext cx="0" cy="0"/>
+          <a:chOff x="0" y="0"/>
+          <a:chExt cx="0" cy="0"/>
+        </a:xfrm>
+      </p:grpSpPr>
+      <p:sp>
+        <p:nvSpPr>
+          <p:cNvPr id="2" name="Title 1"/>
+          <p:cNvSpPr>
+            <a:spLocks noGrp="1"/>
+          </p:cNvSpPr>
+          <p:nvPr>
+            <p:ph type="title"/>
+          </p:nvPr>
+        </p:nvSpPr>
+        <p:spPr/>
+        <p:txBody>
+          <a:bodyPr/>
+          <a:lstStyle/>
+          <a:p>
+            <a:endParaRPr lang="en-US"/>
+          </a:p>
+        </p:txBody>
+      </p:sp>
+      <p:sp>
+        <p:nvSpPr>
+          <p:cNvPr id="3" name="Content Placeholder 2"/>
+          <p:cNvSpPr>
+            <a:spLocks noGrp="1"/>
+          </p:cNvSpPr>
+          <p:nvPr>
+            <p:ph idx="1"/>
+          </p:nvPr>
+        </p:nvSpPr>
+        <p:spPr/>
+        <p:txBody>
+          <a:bodyPr/>
+          <a:lstStyle/>
+          <a:p>
+            <a:r>
+              <a:rPr lang="en-US" dirty="0"/>
+              <a:t>Delete everything after this slide???</a:t>
+            </a:r>
+          </a:p>
+        </p:txBody>
+      </p:sp>
+    </p:spTree>
+    <p:extLst>
+      <p:ext uri="{BB962C8B-B14F-4D97-AF65-F5344CB8AC3E}">
+        <p14:creationId xmlns:p14="http://schemas.microsoft.com/office/powerpoint/2010/main" val="2152612930"/>
+      </p:ext>
+    </p:extLst>
+  </p:cSld>
+  <p:clrMapOvr>
+    <a:masterClrMapping/>
+  </p:clrMapOvr>
+</p:sld>
+</file>
+
+<file path=ppt/slides/slide8.xml><?xml version="1.0" encoding="utf-8"?>
 <p:sld xmlns:a="http://schemas.openxmlformats.org/drawingml/2006/main" xmlns:r="http://schemas.openxmlformats.org/officeDocument/2006/relationships" xmlns:p="http://schemas.openxmlformats.org/presentationml/2006/main">
   <p:cSld>
     <p:spTree>
@@ -4330,840 +6300,6 @@
 </p:sld>
 </file>
 
-<file path=ppt/slides/slide5.xml><?xml version="1.0" encoding="utf-8"?>
-<p:sld xmlns:a="http://schemas.openxmlformats.org/drawingml/2006/main" xmlns:r="http://schemas.openxmlformats.org/officeDocument/2006/relationships" xmlns:p="http://schemas.openxmlformats.org/presentationml/2006/main">
-  <p:cSld>
-    <p:spTree>
-      <p:nvGrpSpPr>
-        <p:cNvPr id="1" name=""/>
-        <p:cNvGrpSpPr/>
-        <p:nvPr/>
-      </p:nvGrpSpPr>
-      <p:grpSpPr>
-        <a:xfrm>
-          <a:off x="0" y="0"/>
-          <a:ext cx="0" cy="0"/>
-          <a:chOff x="0" y="0"/>
-          <a:chExt cx="0" cy="0"/>
-        </a:xfrm>
-      </p:grpSpPr>
-      <p:sp>
-        <p:nvSpPr>
-          <p:cNvPr id="2" name="Title 1"/>
-          <p:cNvSpPr>
-            <a:spLocks noGrp="1"/>
-          </p:cNvSpPr>
-          <p:nvPr>
-            <p:ph type="title"/>
-          </p:nvPr>
-        </p:nvSpPr>
-        <p:spPr/>
-        <p:txBody>
-          <a:bodyPr/>
-          <a:lstStyle/>
-          <a:p>
-            <a:pPr algn="ctr"/>
-            <a:r>
-              <a:rPr lang="en-US" dirty="0"/>
-              <a:t>Linear Interpolation of Data Points</a:t>
-            </a:r>
-          </a:p>
-        </p:txBody>
-      </p:sp>
-      <p:sp>
-        <p:nvSpPr>
-          <p:cNvPr id="3" name="Content Placeholder 2"/>
-          <p:cNvSpPr>
-            <a:spLocks noGrp="1"/>
-          </p:cNvSpPr>
-          <p:nvPr>
-            <p:ph idx="1"/>
-          </p:nvPr>
-        </p:nvSpPr>
-        <p:spPr/>
-        <p:txBody>
-          <a:bodyPr/>
-          <a:lstStyle/>
-          <a:p>
-            <a:r>
-              <a:rPr lang="en-US" dirty="0"/>
-              <a:t>Solid colors are nice, but lack detail.</a:t>
-            </a:r>
-          </a:p>
-          <a:p>
-            <a:pPr lvl="1"/>
-            <a:r>
-              <a:rPr lang="en-US" dirty="0"/>
-              <a:t>What is the temperature between the different points?</a:t>
-            </a:r>
-          </a:p>
-          <a:p>
-            <a:r>
-              <a:rPr lang="en-US" dirty="0"/>
-              <a:t>Solution: Interpolate data points between the measured locations.</a:t>
-            </a:r>
-          </a:p>
-          <a:p>
-            <a:pPr lvl="1"/>
-            <a:r>
-              <a:rPr lang="en-US" dirty="0"/>
-              <a:t>Linear interpolation.</a:t>
-            </a:r>
-          </a:p>
-          <a:p>
-            <a:pPr lvl="2"/>
-            <a:r>
-              <a:rPr lang="en-US" dirty="0"/>
-              <a:t>Y = </a:t>
-            </a:r>
-            <a:r>
-              <a:rPr lang="en-US" dirty="0" err="1"/>
-              <a:t>mX</a:t>
-            </a:r>
-            <a:r>
-              <a:rPr lang="en-US" dirty="0"/>
-              <a:t> + b	where	m = (y1 – y2)/(x1 – x2)</a:t>
-            </a:r>
-          </a:p>
-          <a:p>
-            <a:pPr lvl="1"/>
-            <a:r>
-              <a:rPr lang="en-US" dirty="0"/>
-              <a:t>Quadradic interpolation</a:t>
-            </a:r>
-          </a:p>
-          <a:p>
-            <a:pPr lvl="2"/>
-            <a:r>
-              <a:rPr lang="en-US" dirty="0"/>
-              <a:t>Y = a(x-h)^2 + c		where ‘h’ is the x offset and ‘a’ scales the rate</a:t>
-            </a:r>
-          </a:p>
-          <a:p>
-            <a:pPr lvl="2"/>
-            <a:endParaRPr lang="en-US" dirty="0"/>
-          </a:p>
-        </p:txBody>
-      </p:sp>
-    </p:spTree>
-    <p:extLst>
-      <p:ext uri="{BB962C8B-B14F-4D97-AF65-F5344CB8AC3E}">
-        <p14:creationId xmlns:p14="http://schemas.microsoft.com/office/powerpoint/2010/main" val="2810286071"/>
-      </p:ext>
-    </p:extLst>
-  </p:cSld>
-  <p:clrMapOvr>
-    <a:masterClrMapping/>
-  </p:clrMapOvr>
-</p:sld>
-</file>
-
-<file path=ppt/slides/slide6.xml><?xml version="1.0" encoding="utf-8"?>
-<p:sld xmlns:a="http://schemas.openxmlformats.org/drawingml/2006/main" xmlns:r="http://schemas.openxmlformats.org/officeDocument/2006/relationships" xmlns:p="http://schemas.openxmlformats.org/presentationml/2006/main">
-  <p:cSld>
-    <p:spTree>
-      <p:nvGrpSpPr>
-        <p:cNvPr id="1" name=""/>
-        <p:cNvGrpSpPr/>
-        <p:nvPr/>
-      </p:nvGrpSpPr>
-      <p:grpSpPr>
-        <a:xfrm>
-          <a:off x="0" y="0"/>
-          <a:ext cx="0" cy="0"/>
-          <a:chOff x="0" y="0"/>
-          <a:chExt cx="0" cy="0"/>
-        </a:xfrm>
-      </p:grpSpPr>
-      <p:sp>
-        <p:nvSpPr>
-          <p:cNvPr id="2" name="Title 1"/>
-          <p:cNvSpPr>
-            <a:spLocks noGrp="1"/>
-          </p:cNvSpPr>
-          <p:nvPr>
-            <p:ph type="title"/>
-          </p:nvPr>
-        </p:nvSpPr>
-        <p:spPr/>
-        <p:txBody>
-          <a:bodyPr/>
-          <a:lstStyle/>
-          <a:p>
-            <a:pPr algn="ctr"/>
-            <a:r>
-              <a:rPr lang="en-US" dirty="0"/>
-              <a:t>Linear Interpolation Between 2 Points</a:t>
-            </a:r>
-          </a:p>
-        </p:txBody>
-      </p:sp>
-      <p:pic>
-        <p:nvPicPr>
-          <p:cNvPr id="5" name="Content Placeholder 4"/>
-          <p:cNvPicPr>
-            <a:picLocks noGrp="1" noChangeAspect="1"/>
-          </p:cNvPicPr>
-          <p:nvPr>
-            <p:ph idx="1"/>
-          </p:nvPr>
-        </p:nvPicPr>
-        <p:blipFill>
-          <a:blip r:embed="rId2">
-            <a:extLst>
-              <a:ext uri="{28A0092B-C50C-407E-A947-70E740481C1C}">
-                <a14:useLocalDpi xmlns:a14="http://schemas.microsoft.com/office/drawing/2010/main" val="0"/>
-              </a:ext>
-            </a:extLst>
-          </a:blip>
-          <a:stretch>
-            <a:fillRect/>
-          </a:stretch>
-        </p:blipFill>
-        <p:spPr>
-          <a:xfrm>
-            <a:off x="7492273" y="5357620"/>
-            <a:ext cx="2867425" cy="990738"/>
-          </a:xfrm>
-        </p:spPr>
-      </p:pic>
-      <p:sp>
-        <p:nvSpPr>
-          <p:cNvPr id="8" name="TextBox 7"/>
-          <p:cNvSpPr txBox="1"/>
-          <p:nvPr/>
-        </p:nvSpPr>
-        <p:spPr>
-          <a:xfrm>
-            <a:off x="709127" y="1690688"/>
-            <a:ext cx="4674636" cy="369332"/>
-          </a:xfrm>
-          <a:prstGeom prst="rect">
-            <a:avLst/>
-          </a:prstGeom>
-          <a:noFill/>
-        </p:spPr>
-        <p:txBody>
-          <a:bodyPr wrap="square" rtlCol="0">
-            <a:spAutoFit/>
-          </a:bodyPr>
-          <a:lstStyle/>
-          <a:p>
-            <a:endParaRPr lang="en-US" dirty="0"/>
-          </a:p>
-        </p:txBody>
-      </p:sp>
-      <p:pic>
-        <p:nvPicPr>
-          <p:cNvPr id="10" name="Picture 9"/>
-          <p:cNvPicPr>
-            <a:picLocks noChangeAspect="1"/>
-          </p:cNvPicPr>
-          <p:nvPr/>
-        </p:nvPicPr>
-        <p:blipFill>
-          <a:blip r:embed="rId3">
-            <a:extLst>
-              <a:ext uri="{28A0092B-C50C-407E-A947-70E740481C1C}">
-                <a14:useLocalDpi xmlns:a14="http://schemas.microsoft.com/office/drawing/2010/main" val="0"/>
-              </a:ext>
-            </a:extLst>
-          </a:blip>
-          <a:stretch>
-            <a:fillRect/>
-          </a:stretch>
-        </p:blipFill>
-        <p:spPr>
-          <a:xfrm>
-            <a:off x="7402804" y="1882639"/>
-            <a:ext cx="3046362" cy="3033117"/>
-          </a:xfrm>
-          <a:prstGeom prst="rect">
-            <a:avLst/>
-          </a:prstGeom>
-        </p:spPr>
-      </p:pic>
-      <p:sp>
-        <p:nvSpPr>
-          <p:cNvPr id="11" name="TextBox 10"/>
-          <p:cNvSpPr txBox="1"/>
-          <p:nvPr/>
-        </p:nvSpPr>
-        <p:spPr>
-          <a:xfrm>
-            <a:off x="709127" y="1690688"/>
-            <a:ext cx="5971591" cy="2862322"/>
-          </a:xfrm>
-          <a:prstGeom prst="rect">
-            <a:avLst/>
-          </a:prstGeom>
-          <a:noFill/>
-        </p:spPr>
-        <p:txBody>
-          <a:bodyPr wrap="square" rtlCol="0">
-            <a:spAutoFit/>
-          </a:bodyPr>
-          <a:lstStyle/>
-          <a:p>
-            <a:r>
-              <a:rPr lang="en-US" dirty="0"/>
-              <a:t>RED = -RGB + 255</a:t>
-            </a:r>
-          </a:p>
-          <a:p>
-            <a:r>
-              <a:rPr lang="en-US" dirty="0"/>
-              <a:t>BLUE = RGB</a:t>
-            </a:r>
-          </a:p>
-          <a:p>
-            <a:endParaRPr lang="en-US" dirty="0"/>
-          </a:p>
-          <a:p>
-            <a:r>
-              <a:rPr lang="en-US" dirty="0"/>
-              <a:t>Color(true RGB) = (RED, 0, BLUE)</a:t>
-            </a:r>
-          </a:p>
-          <a:p>
-            <a:r>
-              <a:rPr lang="en-US" dirty="0"/>
-              <a:t>Pros:</a:t>
-            </a:r>
-          </a:p>
-          <a:p>
-            <a:pPr marL="285750" indent="-285750">
-              <a:buFont typeface="Arial" panose="020B0604020202020204" pitchFamily="34" charset="0"/>
-              <a:buChar char="•"/>
-            </a:pPr>
-            <a:r>
-              <a:rPr lang="en-US" dirty="0"/>
-              <a:t>Nice gradient between points</a:t>
-            </a:r>
-          </a:p>
-          <a:p>
-            <a:pPr marL="285750" indent="-285750">
-              <a:buFont typeface="Arial" panose="020B0604020202020204" pitchFamily="34" charset="0"/>
-              <a:buChar char="•"/>
-            </a:pPr>
-            <a:r>
-              <a:rPr lang="en-US" dirty="0"/>
-              <a:t>Covers “hot” and “cold” conditions</a:t>
-            </a:r>
-          </a:p>
-          <a:p>
-            <a:r>
-              <a:rPr lang="en-US" dirty="0"/>
-              <a:t>Cons:</a:t>
-            </a:r>
-          </a:p>
-          <a:p>
-            <a:pPr marL="285750" indent="-285750">
-              <a:buFont typeface="Arial" panose="020B0604020202020204" pitchFamily="34" charset="0"/>
-              <a:buChar char="•"/>
-            </a:pPr>
-            <a:r>
-              <a:rPr lang="en-US" dirty="0"/>
-              <a:t>Lacks color</a:t>
-            </a:r>
-          </a:p>
-          <a:p>
-            <a:pPr marL="742950" lvl="1" indent="-285750">
-              <a:buFont typeface="Arial" panose="020B0604020202020204" pitchFamily="34" charset="0"/>
-              <a:buChar char="•"/>
-            </a:pPr>
-            <a:r>
-              <a:rPr lang="en-US" dirty="0"/>
-              <a:t>No one wants a 2 color heat map!</a:t>
-            </a:r>
-          </a:p>
-        </p:txBody>
-      </p:sp>
-    </p:spTree>
-    <p:extLst>
-      <p:ext uri="{BB962C8B-B14F-4D97-AF65-F5344CB8AC3E}">
-        <p14:creationId xmlns:p14="http://schemas.microsoft.com/office/powerpoint/2010/main" val="3625730890"/>
-      </p:ext>
-    </p:extLst>
-  </p:cSld>
-  <p:clrMapOvr>
-    <a:masterClrMapping/>
-  </p:clrMapOvr>
-</p:sld>
-</file>
-
-<file path=ppt/slides/slide7.xml><?xml version="1.0" encoding="utf-8"?>
-<p:sld xmlns:a="http://schemas.openxmlformats.org/drawingml/2006/main" xmlns:r="http://schemas.openxmlformats.org/officeDocument/2006/relationships" xmlns:p="http://schemas.openxmlformats.org/presentationml/2006/main">
-  <p:cSld>
-    <p:spTree>
-      <p:nvGrpSpPr>
-        <p:cNvPr id="1" name=""/>
-        <p:cNvGrpSpPr/>
-        <p:nvPr/>
-      </p:nvGrpSpPr>
-      <p:grpSpPr>
-        <a:xfrm>
-          <a:off x="0" y="0"/>
-          <a:ext cx="0" cy="0"/>
-          <a:chOff x="0" y="0"/>
-          <a:chExt cx="0" cy="0"/>
-        </a:xfrm>
-      </p:grpSpPr>
-      <p:sp>
-        <p:nvSpPr>
-          <p:cNvPr id="2" name="Title 1"/>
-          <p:cNvSpPr>
-            <a:spLocks noGrp="1"/>
-          </p:cNvSpPr>
-          <p:nvPr>
-            <p:ph type="title"/>
-          </p:nvPr>
-        </p:nvSpPr>
-        <p:spPr>
-          <a:xfrm>
-            <a:off x="838200" y="365125"/>
-            <a:ext cx="10515600" cy="1325563"/>
-          </a:xfrm>
-        </p:spPr>
-        <p:txBody>
-          <a:bodyPr/>
-          <a:lstStyle/>
-          <a:p>
-            <a:pPr algn="ctr"/>
-            <a:r>
-              <a:rPr lang="en-US"/>
-              <a:t>1020 RGB Linear Interpolation</a:t>
-            </a:r>
-            <a:endParaRPr lang="en-US" dirty="0"/>
-          </a:p>
-        </p:txBody>
-      </p:sp>
-      <p:pic>
-        <p:nvPicPr>
-          <p:cNvPr id="4" name="Content Placeholder 3"/>
-          <p:cNvPicPr>
-            <a:picLocks noGrp="1" noChangeAspect="1"/>
-          </p:cNvPicPr>
-          <p:nvPr>
-            <p:ph idx="1"/>
-          </p:nvPr>
-        </p:nvPicPr>
-        <p:blipFill>
-          <a:blip r:embed="rId2">
-            <a:extLst>
-              <a:ext uri="{28A0092B-C50C-407E-A947-70E740481C1C}">
-                <a14:useLocalDpi xmlns:a14="http://schemas.microsoft.com/office/drawing/2010/main" val="0"/>
-              </a:ext>
-            </a:extLst>
-          </a:blip>
-          <a:stretch>
-            <a:fillRect/>
-          </a:stretch>
-        </p:blipFill>
-        <p:spPr>
-          <a:xfrm>
-            <a:off x="3886033" y="1690688"/>
-            <a:ext cx="8161421" cy="2635535"/>
-          </a:xfrm>
-        </p:spPr>
-      </p:pic>
-      <p:pic>
-        <p:nvPicPr>
-          <p:cNvPr id="5" name="Picture 4"/>
-          <p:cNvPicPr>
-            <a:picLocks noChangeAspect="1"/>
-          </p:cNvPicPr>
-          <p:nvPr/>
-        </p:nvPicPr>
-        <p:blipFill>
-          <a:blip r:embed="rId3">
-            <a:extLst>
-              <a:ext uri="{28A0092B-C50C-407E-A947-70E740481C1C}">
-                <a14:useLocalDpi xmlns:a14="http://schemas.microsoft.com/office/drawing/2010/main" val="0"/>
-              </a:ext>
-            </a:extLst>
-          </a:blip>
-          <a:stretch>
-            <a:fillRect/>
-          </a:stretch>
-        </p:blipFill>
-        <p:spPr>
-          <a:xfrm>
-            <a:off x="3886033" y="4519939"/>
-            <a:ext cx="8305967" cy="976720"/>
-          </a:xfrm>
-          <a:prstGeom prst="rect">
-            <a:avLst/>
-          </a:prstGeom>
-        </p:spPr>
-      </p:pic>
-      <p:sp>
-        <p:nvSpPr>
-          <p:cNvPr id="6" name="TextBox 5"/>
-          <p:cNvSpPr txBox="1"/>
-          <p:nvPr/>
-        </p:nvSpPr>
-        <p:spPr>
-          <a:xfrm>
-            <a:off x="343948" y="1690688"/>
-            <a:ext cx="3187817" cy="3970318"/>
-          </a:xfrm>
-          <a:prstGeom prst="rect">
-            <a:avLst/>
-          </a:prstGeom>
-          <a:noFill/>
-        </p:spPr>
-        <p:txBody>
-          <a:bodyPr wrap="square" rtlCol="0">
-            <a:spAutoFit/>
-          </a:bodyPr>
-          <a:lstStyle/>
-          <a:p>
-            <a:r>
-              <a:rPr lang="en-US"/>
-              <a:t>3 colors (Red, Green, Blue) each with a range of 255 –&gt; </a:t>
-            </a:r>
-          </a:p>
-          <a:p>
-            <a:r>
-              <a:rPr lang="en-US"/>
-              <a:t>1020 different values (Assuming start condition of max blue and end condition of max red).</a:t>
-            </a:r>
-          </a:p>
-          <a:p>
-            <a:endParaRPr lang="en-US"/>
-          </a:p>
-          <a:p>
-            <a:r>
-              <a:rPr lang="en-US"/>
-              <a:t>Pros:</a:t>
-            </a:r>
-          </a:p>
-          <a:p>
-            <a:pPr marL="285750" indent="-285750">
-              <a:buFont typeface="Arial" panose="020B0604020202020204" pitchFamily="34" charset="0"/>
-              <a:buChar char="•"/>
-            </a:pPr>
-            <a:r>
-              <a:rPr lang="en-US"/>
-              <a:t>Lots of color. </a:t>
-            </a:r>
-          </a:p>
-          <a:p>
-            <a:pPr marL="285750" indent="-285750">
-              <a:buFont typeface="Arial" panose="020B0604020202020204" pitchFamily="34" charset="0"/>
-              <a:buChar char="•"/>
-            </a:pPr>
-            <a:r>
-              <a:rPr lang="en-US"/>
-              <a:t>Not only hot and cold but warm</a:t>
-            </a:r>
-          </a:p>
-          <a:p>
-            <a:r>
-              <a:rPr lang="en-US"/>
-              <a:t>Cons:</a:t>
-            </a:r>
-          </a:p>
-          <a:p>
-            <a:pPr marL="285750" indent="-285750">
-              <a:buFont typeface="Arial" panose="020B0604020202020204" pitchFamily="34" charset="0"/>
-              <a:buChar char="•"/>
-            </a:pPr>
-            <a:r>
-              <a:rPr lang="en-US"/>
-              <a:t>No color between heat zones</a:t>
-            </a:r>
-          </a:p>
-          <a:p>
-            <a:pPr marL="742950" lvl="1" indent="-285750">
-              <a:buFont typeface="Arial" panose="020B0604020202020204" pitchFamily="34" charset="0"/>
-              <a:buChar char="•"/>
-            </a:pPr>
-            <a:r>
-              <a:rPr lang="en-US"/>
-              <a:t>Hot? Cold?</a:t>
-            </a:r>
-          </a:p>
-          <a:p>
-            <a:pPr marL="285750" indent="-285750">
-              <a:buFont typeface="Arial" panose="020B0604020202020204" pitchFamily="34" charset="0"/>
-              <a:buChar char="•"/>
-            </a:pPr>
-            <a:r>
-              <a:rPr lang="en-US"/>
-              <a:t>No gradient</a:t>
-            </a:r>
-            <a:endParaRPr lang="en-US" dirty="0"/>
-          </a:p>
-        </p:txBody>
-      </p:sp>
-    </p:spTree>
-    <p:extLst>
-      <p:ext uri="{BB962C8B-B14F-4D97-AF65-F5344CB8AC3E}">
-        <p14:creationId xmlns:p14="http://schemas.microsoft.com/office/powerpoint/2010/main" val="1674379375"/>
-      </p:ext>
-    </p:extLst>
-  </p:cSld>
-  <p:clrMapOvr>
-    <a:masterClrMapping/>
-  </p:clrMapOvr>
-</p:sld>
-</file>
-
-<file path=ppt/slides/slide8.xml><?xml version="1.0" encoding="utf-8"?>
-<p:sld xmlns:a="http://schemas.openxmlformats.org/drawingml/2006/main" xmlns:r="http://schemas.openxmlformats.org/officeDocument/2006/relationships" xmlns:p="http://schemas.openxmlformats.org/presentationml/2006/main">
-  <p:cSld>
-    <p:spTree>
-      <p:nvGrpSpPr>
-        <p:cNvPr id="1" name=""/>
-        <p:cNvGrpSpPr/>
-        <p:nvPr/>
-      </p:nvGrpSpPr>
-      <p:grpSpPr>
-        <a:xfrm>
-          <a:off x="0" y="0"/>
-          <a:ext cx="0" cy="0"/>
-          <a:chOff x="0" y="0"/>
-          <a:chExt cx="0" cy="0"/>
-        </a:xfrm>
-      </p:grpSpPr>
-      <p:pic>
-        <p:nvPicPr>
-          <p:cNvPr id="11" name="Picture 10"/>
-          <p:cNvPicPr>
-            <a:picLocks noChangeAspect="1"/>
-          </p:cNvPicPr>
-          <p:nvPr/>
-        </p:nvPicPr>
-        <p:blipFill>
-          <a:blip r:embed="rId2">
-            <a:extLst>
-              <a:ext uri="{28A0092B-C50C-407E-A947-70E740481C1C}">
-                <a14:useLocalDpi xmlns:a14="http://schemas.microsoft.com/office/drawing/2010/main" val="0"/>
-              </a:ext>
-            </a:extLst>
-          </a:blip>
-          <a:stretch>
-            <a:fillRect/>
-          </a:stretch>
-        </p:blipFill>
-        <p:spPr>
-          <a:xfrm>
-            <a:off x="1319703" y="2313817"/>
-            <a:ext cx="3399294" cy="2686204"/>
-          </a:xfrm>
-          <a:prstGeom prst="rect">
-            <a:avLst/>
-          </a:prstGeom>
-        </p:spPr>
-      </p:pic>
-      <p:sp>
-        <p:nvSpPr>
-          <p:cNvPr id="2" name="Title 1"/>
-          <p:cNvSpPr>
-            <a:spLocks noGrp="1"/>
-          </p:cNvSpPr>
-          <p:nvPr>
-            <p:ph type="title"/>
-          </p:nvPr>
-        </p:nvSpPr>
-        <p:spPr/>
-        <p:txBody>
-          <a:bodyPr/>
-          <a:lstStyle/>
-          <a:p>
-            <a:pPr algn="ctr"/>
-            <a:r>
-              <a:rPr lang="en-US" dirty="0"/>
-              <a:t>510 RGB Linear Interpolation</a:t>
-            </a:r>
-          </a:p>
-        </p:txBody>
-      </p:sp>
-      <p:pic>
-        <p:nvPicPr>
-          <p:cNvPr id="5" name="Content Placeholder 4"/>
-          <p:cNvPicPr>
-            <a:picLocks noGrp="1" noChangeAspect="1"/>
-          </p:cNvPicPr>
-          <p:nvPr>
-            <p:ph idx="1"/>
-          </p:nvPr>
-        </p:nvPicPr>
-        <p:blipFill>
-          <a:blip r:embed="rId3">
-            <a:extLst>
-              <a:ext uri="{28A0092B-C50C-407E-A947-70E740481C1C}">
-                <a14:useLocalDpi xmlns:a14="http://schemas.microsoft.com/office/drawing/2010/main" val="0"/>
-              </a:ext>
-            </a:extLst>
-          </a:blip>
-          <a:stretch>
-            <a:fillRect/>
-          </a:stretch>
-        </p:blipFill>
-        <p:spPr>
-          <a:xfrm>
-            <a:off x="6441829" y="1690688"/>
-            <a:ext cx="5247747" cy="3309333"/>
-          </a:xfrm>
-        </p:spPr>
-      </p:pic>
-      <p:pic>
-        <p:nvPicPr>
-          <p:cNvPr id="7" name="Picture 6"/>
-          <p:cNvPicPr>
-            <a:picLocks noChangeAspect="1"/>
-          </p:cNvPicPr>
-          <p:nvPr/>
-        </p:nvPicPr>
-        <p:blipFill>
-          <a:blip r:embed="rId4">
-            <a:extLst>
-              <a:ext uri="{28A0092B-C50C-407E-A947-70E740481C1C}">
-                <a14:useLocalDpi xmlns:a14="http://schemas.microsoft.com/office/drawing/2010/main" val="0"/>
-              </a:ext>
-            </a:extLst>
-          </a:blip>
-          <a:stretch>
-            <a:fillRect/>
-          </a:stretch>
-        </p:blipFill>
-        <p:spPr>
-          <a:xfrm>
-            <a:off x="6488200" y="5000021"/>
-            <a:ext cx="5201376" cy="1295581"/>
-          </a:xfrm>
-          <a:prstGeom prst="rect">
-            <a:avLst/>
-          </a:prstGeom>
-        </p:spPr>
-      </p:pic>
-      <p:sp>
-        <p:nvSpPr>
-          <p:cNvPr id="9" name="TextBox 8"/>
-          <p:cNvSpPr txBox="1"/>
-          <p:nvPr/>
-        </p:nvSpPr>
-        <p:spPr>
-          <a:xfrm>
-            <a:off x="440764" y="1690688"/>
-            <a:ext cx="6241409" cy="4801314"/>
-          </a:xfrm>
-          <a:prstGeom prst="rect">
-            <a:avLst/>
-          </a:prstGeom>
-          <a:noFill/>
-        </p:spPr>
-        <p:txBody>
-          <a:bodyPr wrap="square" rtlCol="0">
-            <a:spAutoFit/>
-          </a:bodyPr>
-          <a:lstStyle/>
-          <a:p>
-            <a:r>
-              <a:rPr lang="en-US" dirty="0"/>
-              <a:t>Cut the number of RGB values in half. </a:t>
-            </a:r>
-          </a:p>
-          <a:p>
-            <a:endParaRPr lang="en-US" dirty="0"/>
-          </a:p>
-          <a:p>
-            <a:endParaRPr lang="en-US" dirty="0"/>
-          </a:p>
-          <a:p>
-            <a:endParaRPr lang="en-US" dirty="0"/>
-          </a:p>
-          <a:p>
-            <a:endParaRPr lang="en-US" dirty="0"/>
-          </a:p>
-          <a:p>
-            <a:endParaRPr lang="en-US" dirty="0"/>
-          </a:p>
-          <a:p>
-            <a:endParaRPr lang="en-US" dirty="0"/>
-          </a:p>
-          <a:p>
-            <a:endParaRPr lang="en-US" dirty="0"/>
-          </a:p>
-          <a:p>
-            <a:endParaRPr lang="en-US" dirty="0"/>
-          </a:p>
-          <a:p>
-            <a:endParaRPr lang="en-US" dirty="0"/>
-          </a:p>
-          <a:p>
-            <a:endParaRPr lang="en-US" dirty="0"/>
-          </a:p>
-          <a:p>
-            <a:r>
-              <a:rPr lang="en-US" dirty="0"/>
-              <a:t>Pros:</a:t>
-            </a:r>
-          </a:p>
-          <a:p>
-            <a:pPr marL="285750" indent="-285750">
-              <a:buFont typeface="Arial" panose="020B0604020202020204" pitchFamily="34" charset="0"/>
-              <a:buChar char="•"/>
-            </a:pPr>
-            <a:r>
-              <a:rPr lang="en-US" dirty="0"/>
-              <a:t>Lots of color and color variants</a:t>
-            </a:r>
-          </a:p>
-          <a:p>
-            <a:pPr marL="742950" lvl="1" indent="-285750">
-              <a:buFont typeface="Arial" panose="020B0604020202020204" pitchFamily="34" charset="0"/>
-              <a:buChar char="•"/>
-            </a:pPr>
-            <a:r>
-              <a:rPr lang="en-US" dirty="0"/>
-              <a:t>Easy to tell hot from cold from warm</a:t>
-            </a:r>
-          </a:p>
-          <a:p>
-            <a:pPr marL="285750" indent="-285750">
-              <a:buFont typeface="Arial" panose="020B0604020202020204" pitchFamily="34" charset="0"/>
-              <a:buChar char="•"/>
-            </a:pPr>
-            <a:r>
-              <a:rPr lang="en-US" dirty="0"/>
-              <a:t>Great looking gradient between colors</a:t>
-            </a:r>
-          </a:p>
-          <a:p>
-            <a:r>
-              <a:rPr lang="en-US" dirty="0"/>
-              <a:t>Cons:</a:t>
-            </a:r>
-          </a:p>
-          <a:p>
-            <a:pPr marL="285750" indent="-285750">
-              <a:buFont typeface="Arial" panose="020B0604020202020204" pitchFamily="34" charset="0"/>
-              <a:buChar char="•"/>
-            </a:pPr>
-            <a:r>
-              <a:rPr lang="en-US" dirty="0"/>
-              <a:t>None.</a:t>
-            </a:r>
-          </a:p>
-        </p:txBody>
-      </p:sp>
-    </p:spTree>
-    <p:extLst>
-      <p:ext uri="{BB962C8B-B14F-4D97-AF65-F5344CB8AC3E}">
-        <p14:creationId xmlns:p14="http://schemas.microsoft.com/office/powerpoint/2010/main" val="932961816"/>
-      </p:ext>
-    </p:extLst>
-  </p:cSld>
-  <p:clrMapOvr>
-    <a:masterClrMapping/>
-  </p:clrMapOvr>
-</p:sld>
-</file>
-
 <file path=ppt/slides/slide9.xml><?xml version="1.0" encoding="utf-8"?>
 <p:sld xmlns:a="http://schemas.openxmlformats.org/drawingml/2006/main" xmlns:r="http://schemas.openxmlformats.org/officeDocument/2006/relationships" xmlns:p="http://schemas.openxmlformats.org/presentationml/2006/main">
   <p:cSld>
@@ -5199,44 +6335,90 @@
             <a:pPr algn="ctr"/>
             <a:r>
               <a:rPr lang="en-US" dirty="0"/>
-              <a:t>510 Quadratic RGB Interpolation</a:t>
-            </a:r>
-          </a:p>
-        </p:txBody>
-      </p:sp>
-      <p:pic>
-        <p:nvPicPr>
-          <p:cNvPr id="4" name="Content Placeholder 3"/>
-          <p:cNvPicPr>
-            <a:picLocks noGrp="1" noChangeAspect="1"/>
-          </p:cNvPicPr>
+              <a:t>Linear Interpolation of Data Points</a:t>
+            </a:r>
+          </a:p>
+        </p:txBody>
+      </p:sp>
+      <p:sp>
+        <p:nvSpPr>
+          <p:cNvPr id="3" name="Content Placeholder 2"/>
+          <p:cNvSpPr>
+            <a:spLocks noGrp="1"/>
+          </p:cNvSpPr>
           <p:nvPr>
             <p:ph idx="1"/>
           </p:nvPr>
-        </p:nvPicPr>
-        <p:blipFill>
-          <a:blip r:embed="rId2">
-            <a:extLst>
-              <a:ext uri="{28A0092B-C50C-407E-A947-70E740481C1C}">
-                <a14:useLocalDpi xmlns:a14="http://schemas.microsoft.com/office/drawing/2010/main" val="0"/>
-              </a:ext>
-            </a:extLst>
-          </a:blip>
-          <a:stretch>
-            <a:fillRect/>
-          </a:stretch>
-        </p:blipFill>
-        <p:spPr>
-          <a:xfrm>
-            <a:off x="2837995" y="1690688"/>
-            <a:ext cx="6516009" cy="3410426"/>
-          </a:xfrm>
-        </p:spPr>
-      </p:pic>
+        </p:nvSpPr>
+        <p:spPr/>
+        <p:txBody>
+          <a:bodyPr/>
+          <a:lstStyle/>
+          <a:p>
+            <a:r>
+              <a:rPr lang="en-US" dirty="0"/>
+              <a:t>Solid colors are nice, but lack detail.</a:t>
+            </a:r>
+          </a:p>
+          <a:p>
+            <a:pPr lvl="1"/>
+            <a:r>
+              <a:rPr lang="en-US" dirty="0"/>
+              <a:t>What is the temperature between the different points?</a:t>
+            </a:r>
+          </a:p>
+          <a:p>
+            <a:r>
+              <a:rPr lang="en-US" dirty="0"/>
+              <a:t>Solution: Interpolate data points between the measured locations.</a:t>
+            </a:r>
+          </a:p>
+          <a:p>
+            <a:pPr lvl="1"/>
+            <a:r>
+              <a:rPr lang="en-US" dirty="0"/>
+              <a:t>Linear interpolation.</a:t>
+            </a:r>
+          </a:p>
+          <a:p>
+            <a:pPr lvl="2"/>
+            <a:r>
+              <a:rPr lang="en-US" dirty="0"/>
+              <a:t>Y = </a:t>
+            </a:r>
+            <a:r>
+              <a:rPr lang="en-US" dirty="0" err="1"/>
+              <a:t>mX</a:t>
+            </a:r>
+            <a:r>
+              <a:rPr lang="en-US" dirty="0"/>
+              <a:t> + b	where	m = (y1 – y2)/(x1 – x2)</a:t>
+            </a:r>
+          </a:p>
+          <a:p>
+            <a:pPr lvl="1"/>
+            <a:r>
+              <a:rPr lang="en-US" dirty="0"/>
+              <a:t>Quadradic interpolation</a:t>
+            </a:r>
+          </a:p>
+          <a:p>
+            <a:pPr lvl="2"/>
+            <a:r>
+              <a:rPr lang="en-US" dirty="0"/>
+              <a:t>Y = a(x-h)^2 + c		where ‘h’ is the x offset and ‘a’ scales the rate</a:t>
+            </a:r>
+          </a:p>
+          <a:p>
+            <a:pPr lvl="2"/>
+            <a:endParaRPr lang="en-US" dirty="0"/>
+          </a:p>
+        </p:txBody>
+      </p:sp>
     </p:spTree>
     <p:extLst>
       <p:ext uri="{BB962C8B-B14F-4D97-AF65-F5344CB8AC3E}">
-        <p14:creationId xmlns:p14="http://schemas.microsoft.com/office/powerpoint/2010/main" val="2120599663"/>
+        <p14:creationId xmlns:p14="http://schemas.microsoft.com/office/powerpoint/2010/main" val="2810286071"/>
       </p:ext>
     </p:extLst>
   </p:cSld>
@@ -5505,4 +6687,299 @@
     </a:ext>
   </a:extLst>
 </a:theme>
+</file>
+
+<file path=ppt/theme/theme2.xml><?xml version="1.0" encoding="utf-8"?>
+<a:theme xmlns:a="http://schemas.openxmlformats.org/drawingml/2006/main" name="Office Theme">
+  <a:themeElements>
+    <a:clrScheme name="Office">
+      <a:dk1>
+        <a:sysClr val="windowText" lastClr="000000"/>
+      </a:dk1>
+      <a:lt1>
+        <a:sysClr val="window" lastClr="FFFFFF"/>
+      </a:lt1>
+      <a:dk2>
+        <a:srgbClr val="44546A"/>
+      </a:dk2>
+      <a:lt2>
+        <a:srgbClr val="E7E6E6"/>
+      </a:lt2>
+      <a:accent1>
+        <a:srgbClr val="4472C4"/>
+      </a:accent1>
+      <a:accent2>
+        <a:srgbClr val="ED7D31"/>
+      </a:accent2>
+      <a:accent3>
+        <a:srgbClr val="A5A5A5"/>
+      </a:accent3>
+      <a:accent4>
+        <a:srgbClr val="FFC000"/>
+      </a:accent4>
+      <a:accent5>
+        <a:srgbClr val="5B9BD5"/>
+      </a:accent5>
+      <a:accent6>
+        <a:srgbClr val="70AD47"/>
+      </a:accent6>
+      <a:hlink>
+        <a:srgbClr val="0563C1"/>
+      </a:hlink>
+      <a:folHlink>
+        <a:srgbClr val="954F72"/>
+      </a:folHlink>
+    </a:clrScheme>
+    <a:fontScheme name="Office">
+      <a:majorFont>
+        <a:latin typeface="Calibri Light" panose="020F0302020204030204"/>
+        <a:ea typeface=""/>
+        <a:cs typeface=""/>
+        <a:font script="Jpan" typeface="游ゴシック Light"/>
+        <a:font script="Hang" typeface="맑은 고딕"/>
+        <a:font script="Hans" typeface="等线 Light"/>
+        <a:font script="Hant" typeface="新細明體"/>
+        <a:font script="Arab" typeface="Times New Roman"/>
+        <a:font script="Hebr" typeface="Times New Roman"/>
+        <a:font script="Thai" typeface="Angsana New"/>
+        <a:font script="Ethi" typeface="Nyala"/>
+        <a:font script="Beng" typeface="Vrinda"/>
+        <a:font script="Gujr" typeface="Shruti"/>
+        <a:font script="Khmr" typeface="MoolBoran"/>
+        <a:font script="Knda" typeface="Tunga"/>
+        <a:font script="Guru" typeface="Raavi"/>
+        <a:font script="Cans" typeface="Euphemia"/>
+        <a:font script="Cher" typeface="Plantagenet Cherokee"/>
+        <a:font script="Yiii" typeface="Microsoft Yi Baiti"/>
+        <a:font script="Tibt" typeface="Microsoft Himalaya"/>
+        <a:font script="Thaa" typeface="MV Boli"/>
+        <a:font script="Deva" typeface="Mangal"/>
+        <a:font script="Telu" typeface="Gautami"/>
+        <a:font script="Taml" typeface="Latha"/>
+        <a:font script="Syrc" typeface="Estrangelo Edessa"/>
+        <a:font script="Orya" typeface="Kalinga"/>
+        <a:font script="Mlym" typeface="Kartika"/>
+        <a:font script="Laoo" typeface="DokChampa"/>
+        <a:font script="Sinh" typeface="Iskoola Pota"/>
+        <a:font script="Mong" typeface="Mongolian Baiti"/>
+        <a:font script="Viet" typeface="Times New Roman"/>
+        <a:font script="Uigh" typeface="Microsoft Uighur"/>
+        <a:font script="Geor" typeface="Sylfaen"/>
+        <a:font script="Armn" typeface="Arial"/>
+        <a:font script="Bugi" typeface="Leelawadee UI"/>
+        <a:font script="Bopo" typeface="Microsoft JhengHei"/>
+        <a:font script="Java" typeface="Javanese Text"/>
+        <a:font script="Lisu" typeface="Segoe UI"/>
+        <a:font script="Mymr" typeface="Myanmar Text"/>
+        <a:font script="Nkoo" typeface="Ebrima"/>
+        <a:font script="Olck" typeface="Nirmala UI"/>
+        <a:font script="Osma" typeface="Ebrima"/>
+        <a:font script="Phag" typeface="Phagspa"/>
+        <a:font script="Syrn" typeface="Estrangelo Edessa"/>
+        <a:font script="Syrj" typeface="Estrangelo Edessa"/>
+        <a:font script="Syre" typeface="Estrangelo Edessa"/>
+        <a:font script="Sora" typeface="Nirmala UI"/>
+        <a:font script="Tale" typeface="Microsoft Tai Le"/>
+        <a:font script="Talu" typeface="Microsoft New Tai Lue"/>
+        <a:font script="Tfng" typeface="Ebrima"/>
+      </a:majorFont>
+      <a:minorFont>
+        <a:latin typeface="Calibri" panose="020F0502020204030204"/>
+        <a:ea typeface=""/>
+        <a:cs typeface=""/>
+        <a:font script="Jpan" typeface="游ゴシック"/>
+        <a:font script="Hang" typeface="맑은 고딕"/>
+        <a:font script="Hans" typeface="等线"/>
+        <a:font script="Hant" typeface="新細明體"/>
+        <a:font script="Arab" typeface="Arial"/>
+        <a:font script="Hebr" typeface="Arial"/>
+        <a:font script="Thai" typeface="Cordia New"/>
+        <a:font script="Ethi" typeface="Nyala"/>
+        <a:font script="Beng" typeface="Vrinda"/>
+        <a:font script="Gujr" typeface="Shruti"/>
+        <a:font script="Khmr" typeface="DaunPenh"/>
+        <a:font script="Knda" typeface="Tunga"/>
+        <a:font script="Guru" typeface="Raavi"/>
+        <a:font script="Cans" typeface="Euphemia"/>
+        <a:font script="Cher" typeface="Plantagenet Cherokee"/>
+        <a:font script="Yiii" typeface="Microsoft Yi Baiti"/>
+        <a:font script="Tibt" typeface="Microsoft Himalaya"/>
+        <a:font script="Thaa" typeface="MV Boli"/>
+        <a:font script="Deva" typeface="Mangal"/>
+        <a:font script="Telu" typeface="Gautami"/>
+        <a:font script="Taml" typeface="Latha"/>
+        <a:font script="Syrc" typeface="Estrangelo Edessa"/>
+        <a:font script="Orya" typeface="Kalinga"/>
+        <a:font script="Mlym" typeface="Kartika"/>
+        <a:font script="Laoo" typeface="DokChampa"/>
+        <a:font script="Sinh" typeface="Iskoola Pota"/>
+        <a:font script="Mong" typeface="Mongolian Baiti"/>
+        <a:font script="Viet" typeface="Arial"/>
+        <a:font script="Uigh" typeface="Microsoft Uighur"/>
+        <a:font script="Geor" typeface="Sylfaen"/>
+        <a:font script="Armn" typeface="Arial"/>
+        <a:font script="Bugi" typeface="Leelawadee UI"/>
+        <a:font script="Bopo" typeface="Microsoft JhengHei"/>
+        <a:font script="Java" typeface="Javanese Text"/>
+        <a:font script="Lisu" typeface="Segoe UI"/>
+        <a:font script="Mymr" typeface="Myanmar Text"/>
+        <a:font script="Nkoo" typeface="Ebrima"/>
+        <a:font script="Olck" typeface="Nirmala UI"/>
+        <a:font script="Osma" typeface="Ebrima"/>
+        <a:font script="Phag" typeface="Phagspa"/>
+        <a:font script="Syrn" typeface="Estrangelo Edessa"/>
+        <a:font script="Syrj" typeface="Estrangelo Edessa"/>
+        <a:font script="Syre" typeface="Estrangelo Edessa"/>
+        <a:font script="Sora" typeface="Nirmala UI"/>
+        <a:font script="Tale" typeface="Microsoft Tai Le"/>
+        <a:font script="Talu" typeface="Microsoft New Tai Lue"/>
+        <a:font script="Tfng" typeface="Ebrima"/>
+      </a:minorFont>
+    </a:fontScheme>
+    <a:fmtScheme name="Office">
+      <a:fillStyleLst>
+        <a:solidFill>
+          <a:schemeClr val="phClr"/>
+        </a:solidFill>
+        <a:gradFill rotWithShape="1">
+          <a:gsLst>
+            <a:gs pos="0">
+              <a:schemeClr val="phClr">
+                <a:lumMod val="110000"/>
+                <a:satMod val="105000"/>
+                <a:tint val="67000"/>
+              </a:schemeClr>
+            </a:gs>
+            <a:gs pos="50000">
+              <a:schemeClr val="phClr">
+                <a:lumMod val="105000"/>
+                <a:satMod val="103000"/>
+                <a:tint val="73000"/>
+              </a:schemeClr>
+            </a:gs>
+            <a:gs pos="100000">
+              <a:schemeClr val="phClr">
+                <a:lumMod val="105000"/>
+                <a:satMod val="109000"/>
+                <a:tint val="81000"/>
+              </a:schemeClr>
+            </a:gs>
+          </a:gsLst>
+          <a:lin ang="5400000" scaled="0"/>
+        </a:gradFill>
+        <a:gradFill rotWithShape="1">
+          <a:gsLst>
+            <a:gs pos="0">
+              <a:schemeClr val="phClr">
+                <a:satMod val="103000"/>
+                <a:lumMod val="102000"/>
+                <a:tint val="94000"/>
+              </a:schemeClr>
+            </a:gs>
+            <a:gs pos="50000">
+              <a:schemeClr val="phClr">
+                <a:satMod val="110000"/>
+                <a:lumMod val="100000"/>
+                <a:shade val="100000"/>
+              </a:schemeClr>
+            </a:gs>
+            <a:gs pos="100000">
+              <a:schemeClr val="phClr">
+                <a:lumMod val="99000"/>
+                <a:satMod val="120000"/>
+                <a:shade val="78000"/>
+              </a:schemeClr>
+            </a:gs>
+          </a:gsLst>
+          <a:lin ang="5400000" scaled="0"/>
+        </a:gradFill>
+      </a:fillStyleLst>
+      <a:lnStyleLst>
+        <a:ln w="6350" cap="flat" cmpd="sng" algn="ctr">
+          <a:solidFill>
+            <a:schemeClr val="phClr"/>
+          </a:solidFill>
+          <a:prstDash val="solid"/>
+          <a:miter lim="800000"/>
+        </a:ln>
+        <a:ln w="12700" cap="flat" cmpd="sng" algn="ctr">
+          <a:solidFill>
+            <a:schemeClr val="phClr"/>
+          </a:solidFill>
+          <a:prstDash val="solid"/>
+          <a:miter lim="800000"/>
+        </a:ln>
+        <a:ln w="19050" cap="flat" cmpd="sng" algn="ctr">
+          <a:solidFill>
+            <a:schemeClr val="phClr"/>
+          </a:solidFill>
+          <a:prstDash val="solid"/>
+          <a:miter lim="800000"/>
+        </a:ln>
+      </a:lnStyleLst>
+      <a:effectStyleLst>
+        <a:effectStyle>
+          <a:effectLst/>
+        </a:effectStyle>
+        <a:effectStyle>
+          <a:effectLst/>
+        </a:effectStyle>
+        <a:effectStyle>
+          <a:effectLst>
+            <a:outerShdw blurRad="57150" dist="19050" dir="5400000" algn="ctr" rotWithShape="0">
+              <a:srgbClr val="000000">
+                <a:alpha val="63000"/>
+              </a:srgbClr>
+            </a:outerShdw>
+          </a:effectLst>
+        </a:effectStyle>
+      </a:effectStyleLst>
+      <a:bgFillStyleLst>
+        <a:solidFill>
+          <a:schemeClr val="phClr"/>
+        </a:solidFill>
+        <a:solidFill>
+          <a:schemeClr val="phClr">
+            <a:tint val="95000"/>
+            <a:satMod val="170000"/>
+          </a:schemeClr>
+        </a:solidFill>
+        <a:gradFill rotWithShape="1">
+          <a:gsLst>
+            <a:gs pos="0">
+              <a:schemeClr val="phClr">
+                <a:tint val="93000"/>
+                <a:satMod val="150000"/>
+                <a:shade val="98000"/>
+                <a:lumMod val="102000"/>
+              </a:schemeClr>
+            </a:gs>
+            <a:gs pos="50000">
+              <a:schemeClr val="phClr">
+                <a:tint val="98000"/>
+                <a:satMod val="130000"/>
+                <a:shade val="90000"/>
+                <a:lumMod val="103000"/>
+              </a:schemeClr>
+            </a:gs>
+            <a:gs pos="100000">
+              <a:schemeClr val="phClr">
+                <a:shade val="63000"/>
+                <a:satMod val="120000"/>
+              </a:schemeClr>
+            </a:gs>
+          </a:gsLst>
+          <a:lin ang="5400000" scaled="0"/>
+        </a:gradFill>
+      </a:bgFillStyleLst>
+    </a:fmtScheme>
+  </a:themeElements>
+  <a:objectDefaults/>
+  <a:extraClrSchemeLst/>
+  <a:extLst>
+    <a:ext uri="{05A4C25C-085E-4340-85A3-A5531E510DB2}">
+      <thm15:themeFamily xmlns:thm15="http://schemas.microsoft.com/office/thememl/2012/main" name="Office Theme" id="{62F939B6-93AF-4DB8-9C6B-D6C7DFDC589F}" vid="{4A3C46E8-61CC-4603-A589-7422A47A8E4A}"/>
+    </a:ext>
+  </a:extLst>
+</a:theme>
 </file>
</xml_diff>